<commit_message>
Mejoras en la planificación de riego de equipos estacionarios
- Mejoras en la UI
- Se agregaron nuevos modos:
   . Regar una vez
   . Repetir el riego
   . Programa de riego
   . Riego a demanda
   . Riego predictivo
</commit_message>
<xml_diff>
--- a/Documentación/Protocolos/Carátulas equipos.pptx
+++ b/Documentación/Protocolos/Carátulas equipos.pptx
@@ -7,16 +7,17 @@
   <p:sldIdLst>
     <p:sldId id="256" r:id="rId2"/>
     <p:sldId id="257" r:id="rId3"/>
-    <p:sldId id="266" r:id="rId4"/>
-    <p:sldId id="267" r:id="rId5"/>
-    <p:sldId id="258" r:id="rId6"/>
-    <p:sldId id="259" r:id="rId7"/>
-    <p:sldId id="260" r:id="rId8"/>
-    <p:sldId id="261" r:id="rId9"/>
-    <p:sldId id="263" r:id="rId10"/>
-    <p:sldId id="264" r:id="rId11"/>
-    <p:sldId id="262" r:id="rId12"/>
-    <p:sldId id="265" r:id="rId13"/>
+    <p:sldId id="268" r:id="rId4"/>
+    <p:sldId id="266" r:id="rId5"/>
+    <p:sldId id="267" r:id="rId6"/>
+    <p:sldId id="258" r:id="rId7"/>
+    <p:sldId id="259" r:id="rId8"/>
+    <p:sldId id="260" r:id="rId9"/>
+    <p:sldId id="261" r:id="rId10"/>
+    <p:sldId id="263" r:id="rId11"/>
+    <p:sldId id="264" r:id="rId12"/>
+    <p:sldId id="262" r:id="rId13"/>
+    <p:sldId id="265" r:id="rId14"/>
   </p:sldIdLst>
   <p:sldSz cx="12192000" cy="6858000"/>
   <p:notesSz cx="7010400" cy="9296400"/>
@@ -10884,7 +10885,7 @@
           <a:p>
             <a:fld id="{95AF202D-7720-4F33-A7BB-C60F29491137}" type="datetimeFigureOut">
               <a:rPr lang="es-MX" smtClean="0"/>
-              <a:t>23/01/24</a:t>
+              <a:t>07/02/24</a:t>
             </a:fld>
             <a:endParaRPr lang="es-MX"/>
           </a:p>
@@ -11084,7 +11085,7 @@
           <a:p>
             <a:fld id="{95AF202D-7720-4F33-A7BB-C60F29491137}" type="datetimeFigureOut">
               <a:rPr lang="es-MX" smtClean="0"/>
-              <a:t>23/01/24</a:t>
+              <a:t>07/02/24</a:t>
             </a:fld>
             <a:endParaRPr lang="es-MX"/>
           </a:p>
@@ -11294,7 +11295,7 @@
           <a:p>
             <a:fld id="{95AF202D-7720-4F33-A7BB-C60F29491137}" type="datetimeFigureOut">
               <a:rPr lang="es-MX" smtClean="0"/>
-              <a:t>23/01/24</a:t>
+              <a:t>07/02/24</a:t>
             </a:fld>
             <a:endParaRPr lang="es-MX"/>
           </a:p>
@@ -11494,7 +11495,7 @@
           <a:p>
             <a:fld id="{95AF202D-7720-4F33-A7BB-C60F29491137}" type="datetimeFigureOut">
               <a:rPr lang="es-MX" smtClean="0"/>
-              <a:t>23/01/24</a:t>
+              <a:t>07/02/24</a:t>
             </a:fld>
             <a:endParaRPr lang="es-MX"/>
           </a:p>
@@ -11770,7 +11771,7 @@
           <a:p>
             <a:fld id="{95AF202D-7720-4F33-A7BB-C60F29491137}" type="datetimeFigureOut">
               <a:rPr lang="es-MX" smtClean="0"/>
-              <a:t>23/01/24</a:t>
+              <a:t>07/02/24</a:t>
             </a:fld>
             <a:endParaRPr lang="es-MX"/>
           </a:p>
@@ -12038,7 +12039,7 @@
           <a:p>
             <a:fld id="{95AF202D-7720-4F33-A7BB-C60F29491137}" type="datetimeFigureOut">
               <a:rPr lang="es-MX" smtClean="0"/>
-              <a:t>23/01/24</a:t>
+              <a:t>07/02/24</a:t>
             </a:fld>
             <a:endParaRPr lang="es-MX"/>
           </a:p>
@@ -12453,7 +12454,7 @@
           <a:p>
             <a:fld id="{95AF202D-7720-4F33-A7BB-C60F29491137}" type="datetimeFigureOut">
               <a:rPr lang="es-MX" smtClean="0"/>
-              <a:t>23/01/24</a:t>
+              <a:t>07/02/24</a:t>
             </a:fld>
             <a:endParaRPr lang="es-MX"/>
           </a:p>
@@ -12595,7 +12596,7 @@
           <a:p>
             <a:fld id="{95AF202D-7720-4F33-A7BB-C60F29491137}" type="datetimeFigureOut">
               <a:rPr lang="es-MX" smtClean="0"/>
-              <a:t>23/01/24</a:t>
+              <a:t>07/02/24</a:t>
             </a:fld>
             <a:endParaRPr lang="es-MX"/>
           </a:p>
@@ -12708,7 +12709,7 @@
           <a:p>
             <a:fld id="{95AF202D-7720-4F33-A7BB-C60F29491137}" type="datetimeFigureOut">
               <a:rPr lang="es-MX" smtClean="0"/>
-              <a:t>23/01/24</a:t>
+              <a:t>07/02/24</a:t>
             </a:fld>
             <a:endParaRPr lang="es-MX"/>
           </a:p>
@@ -13021,7 +13022,7 @@
           <a:p>
             <a:fld id="{95AF202D-7720-4F33-A7BB-C60F29491137}" type="datetimeFigureOut">
               <a:rPr lang="es-MX" smtClean="0"/>
-              <a:t>23/01/24</a:t>
+              <a:t>07/02/24</a:t>
             </a:fld>
             <a:endParaRPr lang="es-MX"/>
           </a:p>
@@ -13310,7 +13311,7 @@
           <a:p>
             <a:fld id="{95AF202D-7720-4F33-A7BB-C60F29491137}" type="datetimeFigureOut">
               <a:rPr lang="es-MX" smtClean="0"/>
-              <a:t>23/01/24</a:t>
+              <a:t>07/02/24</a:t>
             </a:fld>
             <a:endParaRPr lang="es-MX"/>
           </a:p>
@@ -13553,7 +13554,7 @@
           <a:p>
             <a:fld id="{95AF202D-7720-4F33-A7BB-C60F29491137}" type="datetimeFigureOut">
               <a:rPr lang="es-MX" smtClean="0"/>
-              <a:t>23/01/24</a:t>
+              <a:t>07/02/24</a:t>
             </a:fld>
             <a:endParaRPr lang="es-MX"/>
           </a:p>
@@ -16359,6 +16360,1158 @@
           <a:prstGeom prst="rect">
             <a:avLst/>
           </a:prstGeom>
+          <a:effectLst/>
+        </p:spPr>
+      </p:pic>
+      <p:cxnSp>
+        <p:nvCxnSpPr>
+          <p:cNvPr id="7" name="Conector recto 6">
+            <a:extLst>
+              <a:ext uri="{FF2B5EF4-FFF2-40B4-BE49-F238E27FC236}">
+                <a16:creationId xmlns:a16="http://schemas.microsoft.com/office/drawing/2014/main" id="{7A4799EA-F15E-4CB2-8F51-85A3E43A3101}"/>
+              </a:ext>
+            </a:extLst>
+          </p:cNvPr>
+          <p:cNvCxnSpPr>
+            <a:cxnSpLocks/>
+          </p:cNvCxnSpPr>
+          <p:nvPr/>
+        </p:nvCxnSpPr>
+        <p:spPr>
+          <a:xfrm>
+            <a:off x="3582440" y="3425481"/>
+            <a:ext cx="4995336" cy="0"/>
+          </a:xfrm>
+          <a:prstGeom prst="line">
+            <a:avLst/>
+          </a:prstGeom>
+          <a:effectLst>
+            <a:outerShdw blurRad="50800" dist="38100" dir="2700000" algn="tl" rotWithShape="0">
+              <a:prstClr val="black">
+                <a:alpha val="40000"/>
+              </a:prstClr>
+            </a:outerShdw>
+          </a:effectLst>
+        </p:spPr>
+        <p:style>
+          <a:lnRef idx="3">
+            <a:schemeClr val="dk1"/>
+          </a:lnRef>
+          <a:fillRef idx="0">
+            <a:schemeClr val="dk1"/>
+          </a:fillRef>
+          <a:effectRef idx="2">
+            <a:schemeClr val="dk1"/>
+          </a:effectRef>
+          <a:fontRef idx="minor">
+            <a:schemeClr val="tx1"/>
+          </a:fontRef>
+        </p:style>
+      </p:cxnSp>
+      <p:sp>
+        <p:nvSpPr>
+          <p:cNvPr id="8" name="CuadroTexto 7">
+            <a:extLst>
+              <a:ext uri="{FF2B5EF4-FFF2-40B4-BE49-F238E27FC236}">
+                <a16:creationId xmlns:a16="http://schemas.microsoft.com/office/drawing/2014/main" id="{81D89563-FAE7-D3FC-AE0A-C2705F84D05B}"/>
+              </a:ext>
+            </a:extLst>
+          </p:cNvPr>
+          <p:cNvSpPr txBox="1"/>
+          <p:nvPr/>
+        </p:nvSpPr>
+        <p:spPr>
+          <a:xfrm>
+            <a:off x="5622326" y="3432519"/>
+            <a:ext cx="2955450" cy="338554"/>
+          </a:xfrm>
+          <a:prstGeom prst="rect">
+            <a:avLst/>
+          </a:prstGeom>
+          <a:noFill/>
+        </p:spPr>
+        <p:txBody>
+          <a:bodyPr wrap="square" rtlCol="0">
+            <a:spAutoFit/>
+          </a:bodyPr>
+          <a:lstStyle/>
+          <a:p>
+            <a:pPr algn="r"/>
+            <a:r>
+              <a:rPr lang="es-MX" sz="1600" i="1" dirty="0">
+                <a:effectLst>
+                  <a:outerShdw blurRad="38100" dist="38100" dir="2700000" algn="tl">
+                    <a:srgbClr val="000000">
+                      <a:alpha val="43137"/>
+                    </a:srgbClr>
+                  </a:outerShdw>
+                </a:effectLst>
+                <a:latin typeface="Agency FB" panose="020B0503020202020204" pitchFamily="34" charset="0"/>
+              </a:rPr>
+              <a:t>Movimiento continuo Serie Pv66      treme</a:t>
+            </a:r>
+          </a:p>
+        </p:txBody>
+      </p:sp>
+      <p:pic>
+        <p:nvPicPr>
+          <p:cNvPr id="12" name="Imagen 11">
+            <a:extLst>
+              <a:ext uri="{FF2B5EF4-FFF2-40B4-BE49-F238E27FC236}">
+                <a16:creationId xmlns:a16="http://schemas.microsoft.com/office/drawing/2014/main" id="{75CBA1C0-B9F8-D397-E74E-7065802A6C84}"/>
+              </a:ext>
+            </a:extLst>
+          </p:cNvPr>
+          <p:cNvPicPr>
+            <a:picLocks noChangeAspect="1"/>
+          </p:cNvPicPr>
+          <p:nvPr/>
+        </p:nvPicPr>
+        <p:blipFill>
+          <a:blip r:embed="rId3">
+            <a:biLevel thresh="75000"/>
+          </a:blip>
+          <a:stretch>
+            <a:fillRect/>
+          </a:stretch>
+        </p:blipFill>
+        <p:spPr>
+          <a:xfrm>
+            <a:off x="5542198" y="1846635"/>
+            <a:ext cx="1107603" cy="1107603"/>
+          </a:xfrm>
+          <a:prstGeom prst="rect">
+            <a:avLst/>
+          </a:prstGeom>
+          <a:effectLst>
+            <a:outerShdw blurRad="50800" dist="38100" dir="2700000" algn="tl" rotWithShape="0">
+              <a:prstClr val="black">
+                <a:alpha val="40000"/>
+              </a:prstClr>
+            </a:outerShdw>
+          </a:effectLst>
+        </p:spPr>
+      </p:pic>
+      <p:sp>
+        <p:nvSpPr>
+          <p:cNvPr id="24" name="Elipse 23" descr="Satélite con relleno sólido">
+            <a:extLst>
+              <a:ext uri="{FF2B5EF4-FFF2-40B4-BE49-F238E27FC236}">
+                <a16:creationId xmlns:a16="http://schemas.microsoft.com/office/drawing/2014/main" id="{2DA7B772-128A-1DEA-DEB1-41463FF8CFB5}"/>
+              </a:ext>
+            </a:extLst>
+          </p:cNvPr>
+          <p:cNvSpPr/>
+          <p:nvPr/>
+        </p:nvSpPr>
+        <p:spPr>
+          <a:xfrm>
+            <a:off x="6135223" y="4655680"/>
+            <a:ext cx="421131" cy="421131"/>
+          </a:xfrm>
+          <a:prstGeom prst="ellipse">
+            <a:avLst/>
+          </a:prstGeom>
+          <a:blipFill dpi="0" rotWithShape="1">
+            <a:blip r:embed="rId4">
+              <a:extLst>
+                <a:ext uri="{96DAC541-7B7A-43D3-8B79-37D633B846F1}">
+                  <asvg:svgBlip xmlns:asvg="http://schemas.microsoft.com/office/drawing/2016/SVG/main" r:embed="rId5"/>
+                </a:ext>
+              </a:extLst>
+            </a:blip>
+            <a:srcRect/>
+            <a:stretch>
+              <a:fillRect/>
+            </a:stretch>
+          </a:blipFill>
+          <a:ln w="19050">
+            <a:solidFill>
+              <a:schemeClr val="tx1"/>
+            </a:solidFill>
+          </a:ln>
+        </p:spPr>
+        <p:style>
+          <a:lnRef idx="2">
+            <a:schemeClr val="accent1">
+              <a:shade val="50000"/>
+            </a:schemeClr>
+          </a:lnRef>
+          <a:fillRef idx="1">
+            <a:schemeClr val="accent1"/>
+          </a:fillRef>
+          <a:effectRef idx="0">
+            <a:schemeClr val="accent1"/>
+          </a:effectRef>
+          <a:fontRef idx="minor">
+            <a:schemeClr val="lt1"/>
+          </a:fontRef>
+        </p:style>
+        <p:txBody>
+          <a:bodyPr rtlCol="0" anchor="ctr"/>
+          <a:lstStyle/>
+          <a:p>
+            <a:pPr algn="ctr"/>
+            <a:endParaRPr lang="es-MX"/>
+          </a:p>
+        </p:txBody>
+      </p:sp>
+      <p:sp>
+        <p:nvSpPr>
+          <p:cNvPr id="26" name="Elipse 25" descr="Satélite con relleno sólido">
+            <a:extLst>
+              <a:ext uri="{FF2B5EF4-FFF2-40B4-BE49-F238E27FC236}">
+                <a16:creationId xmlns:a16="http://schemas.microsoft.com/office/drawing/2014/main" id="{C72A8453-DB18-5128-53A1-EBA23F20F0D1}"/>
+              </a:ext>
+            </a:extLst>
+          </p:cNvPr>
+          <p:cNvSpPr/>
+          <p:nvPr/>
+        </p:nvSpPr>
+        <p:spPr>
+          <a:xfrm>
+            <a:off x="5622326" y="4655680"/>
+            <a:ext cx="421131" cy="421131"/>
+          </a:xfrm>
+          <a:prstGeom prst="ellipse">
+            <a:avLst/>
+          </a:prstGeom>
+          <a:blipFill dpi="0" rotWithShape="1">
+            <a:blip r:embed="rId6">
+              <a:extLst>
+                <a:ext uri="{28A0092B-C50C-407E-A947-70E740481C1C}">
+                  <a14:useLocalDpi xmlns:a14="http://schemas.microsoft.com/office/drawing/2010/main" val="0"/>
+                </a:ext>
+                <a:ext uri="{96DAC541-7B7A-43D3-8B79-37D633B846F1}">
+                  <asvg:svgBlip xmlns:asvg="http://schemas.microsoft.com/office/drawing/2016/SVG/main" r:embed="rId7"/>
+                </a:ext>
+              </a:extLst>
+            </a:blip>
+            <a:srcRect/>
+            <a:stretch>
+              <a:fillRect/>
+            </a:stretch>
+          </a:blipFill>
+          <a:ln w="19050">
+            <a:solidFill>
+              <a:schemeClr val="tx1"/>
+            </a:solidFill>
+          </a:ln>
+        </p:spPr>
+        <p:style>
+          <a:lnRef idx="2">
+            <a:schemeClr val="accent1">
+              <a:shade val="50000"/>
+            </a:schemeClr>
+          </a:lnRef>
+          <a:fillRef idx="1">
+            <a:schemeClr val="accent1"/>
+          </a:fillRef>
+          <a:effectRef idx="0">
+            <a:schemeClr val="accent1"/>
+          </a:effectRef>
+          <a:fontRef idx="minor">
+            <a:schemeClr val="lt1"/>
+          </a:fontRef>
+        </p:style>
+        <p:txBody>
+          <a:bodyPr rtlCol="0" anchor="ctr"/>
+          <a:lstStyle/>
+          <a:p>
+            <a:pPr algn="ctr"/>
+            <a:endParaRPr lang="es-MX"/>
+          </a:p>
+        </p:txBody>
+      </p:sp>
+      <p:sp>
+        <p:nvSpPr>
+          <p:cNvPr id="27" name="Elipse 26" descr="Satélite con relleno sólido">
+            <a:extLst>
+              <a:ext uri="{FF2B5EF4-FFF2-40B4-BE49-F238E27FC236}">
+                <a16:creationId xmlns:a16="http://schemas.microsoft.com/office/drawing/2014/main" id="{8F5AA977-B07F-5EFC-5201-C23E3F8600E0}"/>
+              </a:ext>
+            </a:extLst>
+          </p:cNvPr>
+          <p:cNvSpPr/>
+          <p:nvPr/>
+        </p:nvSpPr>
+        <p:spPr>
+          <a:xfrm>
+            <a:off x="4596532" y="4655680"/>
+            <a:ext cx="421131" cy="421131"/>
+          </a:xfrm>
+          <a:prstGeom prst="ellipse">
+            <a:avLst/>
+          </a:prstGeom>
+          <a:blipFill dpi="0" rotWithShape="1">
+            <a:blip r:embed="rId8">
+              <a:extLst>
+                <a:ext uri="{96DAC541-7B7A-43D3-8B79-37D633B846F1}">
+                  <asvg:svgBlip xmlns:asvg="http://schemas.microsoft.com/office/drawing/2016/SVG/main" r:embed="rId9"/>
+                </a:ext>
+              </a:extLst>
+            </a:blip>
+            <a:srcRect/>
+            <a:stretch>
+              <a:fillRect/>
+            </a:stretch>
+          </a:blipFill>
+          <a:ln w="19050">
+            <a:solidFill>
+              <a:schemeClr val="tx1"/>
+            </a:solidFill>
+          </a:ln>
+        </p:spPr>
+        <p:style>
+          <a:lnRef idx="2">
+            <a:schemeClr val="accent1">
+              <a:shade val="50000"/>
+            </a:schemeClr>
+          </a:lnRef>
+          <a:fillRef idx="1">
+            <a:schemeClr val="accent1"/>
+          </a:fillRef>
+          <a:effectRef idx="0">
+            <a:schemeClr val="accent1"/>
+          </a:effectRef>
+          <a:fontRef idx="minor">
+            <a:schemeClr val="lt1"/>
+          </a:fontRef>
+        </p:style>
+        <p:txBody>
+          <a:bodyPr rtlCol="0" anchor="ctr"/>
+          <a:lstStyle/>
+          <a:p>
+            <a:pPr algn="ctr"/>
+            <a:endParaRPr lang="es-MX"/>
+          </a:p>
+        </p:txBody>
+      </p:sp>
+      <p:sp>
+        <p:nvSpPr>
+          <p:cNvPr id="28" name="Elipse 27" descr="Satélite con relleno sólido">
+            <a:extLst>
+              <a:ext uri="{FF2B5EF4-FFF2-40B4-BE49-F238E27FC236}">
+                <a16:creationId xmlns:a16="http://schemas.microsoft.com/office/drawing/2014/main" id="{90F648E1-6A85-669C-2D72-97F255218D11}"/>
+              </a:ext>
+            </a:extLst>
+          </p:cNvPr>
+          <p:cNvSpPr/>
+          <p:nvPr/>
+        </p:nvSpPr>
+        <p:spPr>
+          <a:xfrm>
+            <a:off x="6648119" y="4655680"/>
+            <a:ext cx="421131" cy="421131"/>
+          </a:xfrm>
+          <a:prstGeom prst="ellipse">
+            <a:avLst/>
+          </a:prstGeom>
+          <a:blipFill dpi="0" rotWithShape="1">
+            <a:blip r:embed="rId10">
+              <a:extLst>
+                <a:ext uri="{96DAC541-7B7A-43D3-8B79-37D633B846F1}">
+                  <asvg:svgBlip xmlns:asvg="http://schemas.microsoft.com/office/drawing/2016/SVG/main" r:embed="rId11"/>
+                </a:ext>
+              </a:extLst>
+            </a:blip>
+            <a:srcRect/>
+            <a:stretch>
+              <a:fillRect/>
+            </a:stretch>
+          </a:blipFill>
+          <a:ln w="19050">
+            <a:solidFill>
+              <a:schemeClr val="tx1"/>
+            </a:solidFill>
+          </a:ln>
+        </p:spPr>
+        <p:style>
+          <a:lnRef idx="2">
+            <a:schemeClr val="accent1">
+              <a:shade val="50000"/>
+            </a:schemeClr>
+          </a:lnRef>
+          <a:fillRef idx="1">
+            <a:schemeClr val="accent1"/>
+          </a:fillRef>
+          <a:effectRef idx="0">
+            <a:schemeClr val="accent1"/>
+          </a:effectRef>
+          <a:fontRef idx="minor">
+            <a:schemeClr val="lt1"/>
+          </a:fontRef>
+        </p:style>
+        <p:txBody>
+          <a:bodyPr rtlCol="0" anchor="ctr"/>
+          <a:lstStyle/>
+          <a:p>
+            <a:pPr algn="ctr"/>
+            <a:endParaRPr lang="es-MX"/>
+          </a:p>
+        </p:txBody>
+      </p:sp>
+      <p:sp>
+        <p:nvSpPr>
+          <p:cNvPr id="31" name="Elipse 30" descr="Satélite con relleno sólido">
+            <a:extLst>
+              <a:ext uri="{FF2B5EF4-FFF2-40B4-BE49-F238E27FC236}">
+                <a16:creationId xmlns:a16="http://schemas.microsoft.com/office/drawing/2014/main" id="{CB0A9B60-6007-50EC-35B6-F8B0C8A69839}"/>
+              </a:ext>
+            </a:extLst>
+          </p:cNvPr>
+          <p:cNvSpPr/>
+          <p:nvPr/>
+        </p:nvSpPr>
+        <p:spPr>
+          <a:xfrm>
+            <a:off x="3570738" y="4655680"/>
+            <a:ext cx="421131" cy="421131"/>
+          </a:xfrm>
+          <a:prstGeom prst="ellipse">
+            <a:avLst/>
+          </a:prstGeom>
+          <a:blipFill dpi="0" rotWithShape="1">
+            <a:blip r:embed="rId12">
+              <a:extLst>
+                <a:ext uri="{96DAC541-7B7A-43D3-8B79-37D633B846F1}">
+                  <asvg:svgBlip xmlns:asvg="http://schemas.microsoft.com/office/drawing/2016/SVG/main" r:embed="rId13"/>
+                </a:ext>
+              </a:extLst>
+            </a:blip>
+            <a:srcRect/>
+            <a:stretch>
+              <a:fillRect/>
+            </a:stretch>
+          </a:blipFill>
+          <a:ln w="19050">
+            <a:solidFill>
+              <a:schemeClr val="tx1"/>
+            </a:solidFill>
+          </a:ln>
+        </p:spPr>
+        <p:style>
+          <a:lnRef idx="2">
+            <a:schemeClr val="accent1">
+              <a:shade val="50000"/>
+            </a:schemeClr>
+          </a:lnRef>
+          <a:fillRef idx="1">
+            <a:schemeClr val="accent1"/>
+          </a:fillRef>
+          <a:effectRef idx="0">
+            <a:schemeClr val="accent1"/>
+          </a:effectRef>
+          <a:fontRef idx="minor">
+            <a:schemeClr val="lt1"/>
+          </a:fontRef>
+        </p:style>
+        <p:txBody>
+          <a:bodyPr rtlCol="0" anchor="ctr"/>
+          <a:lstStyle/>
+          <a:p>
+            <a:pPr algn="ctr"/>
+            <a:endParaRPr lang="es-MX"/>
+          </a:p>
+        </p:txBody>
+      </p:sp>
+      <p:sp>
+        <p:nvSpPr>
+          <p:cNvPr id="32" name="Elipse 31" descr="Satélite con relleno sólido">
+            <a:extLst>
+              <a:ext uri="{FF2B5EF4-FFF2-40B4-BE49-F238E27FC236}">
+                <a16:creationId xmlns:a16="http://schemas.microsoft.com/office/drawing/2014/main" id="{2D9A0307-559B-EB28-66D2-2E6A7FE383DE}"/>
+              </a:ext>
+            </a:extLst>
+          </p:cNvPr>
+          <p:cNvSpPr/>
+          <p:nvPr/>
+        </p:nvSpPr>
+        <p:spPr>
+          <a:xfrm>
+            <a:off x="5109429" y="4655680"/>
+            <a:ext cx="421131" cy="421131"/>
+          </a:xfrm>
+          <a:prstGeom prst="ellipse">
+            <a:avLst/>
+          </a:prstGeom>
+          <a:blipFill dpi="0" rotWithShape="1">
+            <a:blip r:embed="rId14">
+              <a:extLst>
+                <a:ext uri="{96DAC541-7B7A-43D3-8B79-37D633B846F1}">
+                  <asvg:svgBlip xmlns:asvg="http://schemas.microsoft.com/office/drawing/2016/SVG/main" r:embed="rId15"/>
+                </a:ext>
+              </a:extLst>
+            </a:blip>
+            <a:srcRect/>
+            <a:stretch>
+              <a:fillRect/>
+            </a:stretch>
+          </a:blipFill>
+          <a:ln w="19050">
+            <a:solidFill>
+              <a:schemeClr val="tx1"/>
+            </a:solidFill>
+          </a:ln>
+        </p:spPr>
+        <p:style>
+          <a:lnRef idx="2">
+            <a:schemeClr val="accent1">
+              <a:shade val="50000"/>
+            </a:schemeClr>
+          </a:lnRef>
+          <a:fillRef idx="1">
+            <a:schemeClr val="accent1"/>
+          </a:fillRef>
+          <a:effectRef idx="0">
+            <a:schemeClr val="accent1"/>
+          </a:effectRef>
+          <a:fontRef idx="minor">
+            <a:schemeClr val="lt1"/>
+          </a:fontRef>
+        </p:style>
+        <p:txBody>
+          <a:bodyPr rtlCol="0" anchor="ctr"/>
+          <a:lstStyle/>
+          <a:p>
+            <a:pPr algn="ctr"/>
+            <a:endParaRPr lang="es-MX"/>
+          </a:p>
+        </p:txBody>
+      </p:sp>
+      <p:grpSp>
+        <p:nvGrpSpPr>
+          <p:cNvPr id="60" name="Grupo 59">
+            <a:extLst>
+              <a:ext uri="{FF2B5EF4-FFF2-40B4-BE49-F238E27FC236}">
+                <a16:creationId xmlns:a16="http://schemas.microsoft.com/office/drawing/2014/main" id="{C0B08284-1601-15A5-C86F-4670A5D603A8}"/>
+              </a:ext>
+            </a:extLst>
+          </p:cNvPr>
+          <p:cNvGrpSpPr/>
+          <p:nvPr/>
+        </p:nvGrpSpPr>
+        <p:grpSpPr>
+          <a:xfrm>
+            <a:off x="4082964" y="4656279"/>
+            <a:ext cx="421131" cy="421131"/>
+            <a:chOff x="5009770" y="3330967"/>
+            <a:chExt cx="421131" cy="421131"/>
+          </a:xfrm>
+        </p:grpSpPr>
+        <p:sp>
+          <p:nvSpPr>
+            <p:cNvPr id="61" name="Elipse 60" descr="Satélite con relleno sólido">
+              <a:extLst>
+                <a:ext uri="{FF2B5EF4-FFF2-40B4-BE49-F238E27FC236}">
+                  <a16:creationId xmlns:a16="http://schemas.microsoft.com/office/drawing/2014/main" id="{BA6DA723-262D-C9E4-8E49-BC8BE58B81C2}"/>
+                </a:ext>
+              </a:extLst>
+            </p:cNvPr>
+            <p:cNvSpPr/>
+            <p:nvPr/>
+          </p:nvSpPr>
+          <p:spPr>
+            <a:xfrm>
+              <a:off x="5009770" y="3330967"/>
+              <a:ext cx="421131" cy="421131"/>
+            </a:xfrm>
+            <a:prstGeom prst="ellipse">
+              <a:avLst/>
+            </a:prstGeom>
+            <a:blipFill dpi="0" rotWithShape="1">
+              <a:blip r:embed="rId16">
+                <a:extLst>
+                  <a:ext uri="{96DAC541-7B7A-43D3-8B79-37D633B846F1}">
+                    <asvg:svgBlip xmlns:asvg="http://schemas.microsoft.com/office/drawing/2016/SVG/main" r:embed="rId17"/>
+                  </a:ext>
+                </a:extLst>
+              </a:blip>
+              <a:srcRect/>
+              <a:stretch>
+                <a:fillRect/>
+              </a:stretch>
+            </a:blipFill>
+            <a:ln w="19050">
+              <a:solidFill>
+                <a:schemeClr val="tx1"/>
+              </a:solidFill>
+            </a:ln>
+          </p:spPr>
+          <p:style>
+            <a:lnRef idx="2">
+              <a:schemeClr val="accent1">
+                <a:shade val="50000"/>
+              </a:schemeClr>
+            </a:lnRef>
+            <a:fillRef idx="1">
+              <a:schemeClr val="accent1"/>
+            </a:fillRef>
+            <a:effectRef idx="0">
+              <a:schemeClr val="accent1"/>
+            </a:effectRef>
+            <a:fontRef idx="minor">
+              <a:schemeClr val="lt1"/>
+            </a:fontRef>
+          </p:style>
+          <p:txBody>
+            <a:bodyPr rtlCol="0" anchor="ctr"/>
+            <a:lstStyle/>
+            <a:p>
+              <a:pPr algn="ctr"/>
+              <a:endParaRPr lang="es-MX"/>
+            </a:p>
+          </p:txBody>
+        </p:sp>
+        <p:pic>
+          <p:nvPicPr>
+            <p:cNvPr id="62" name="Gráfico 61" descr="Planta con relleno sólido">
+              <a:extLst>
+                <a:ext uri="{FF2B5EF4-FFF2-40B4-BE49-F238E27FC236}">
+                  <a16:creationId xmlns:a16="http://schemas.microsoft.com/office/drawing/2014/main" id="{28541FD8-4AFA-930A-097B-E08C2491BA2A}"/>
+                </a:ext>
+              </a:extLst>
+            </p:cNvPr>
+            <p:cNvPicPr>
+              <a:picLocks noChangeAspect="1"/>
+            </p:cNvPicPr>
+            <p:nvPr/>
+          </p:nvPicPr>
+          <p:blipFill>
+            <a:blip r:embed="rId18">
+              <a:extLst>
+                <a:ext uri="{28A0092B-C50C-407E-A947-70E740481C1C}">
+                  <a14:useLocalDpi xmlns:a14="http://schemas.microsoft.com/office/drawing/2010/main" val="0"/>
+                </a:ext>
+                <a:ext uri="{96DAC541-7B7A-43D3-8B79-37D633B846F1}">
+                  <asvg:svgBlip xmlns:asvg="http://schemas.microsoft.com/office/drawing/2016/SVG/main" r:embed="rId19"/>
+                </a:ext>
+              </a:extLst>
+            </a:blip>
+            <a:stretch>
+              <a:fillRect/>
+            </a:stretch>
+          </p:blipFill>
+          <p:spPr>
+            <a:xfrm rot="1309914">
+              <a:off x="5075084" y="3396168"/>
+              <a:ext cx="238483" cy="238483"/>
+            </a:xfrm>
+            <a:prstGeom prst="rect">
+              <a:avLst/>
+            </a:prstGeom>
+          </p:spPr>
+        </p:pic>
+      </p:grpSp>
+      <p:pic>
+        <p:nvPicPr>
+          <p:cNvPr id="63" name="Imagen 62">
+            <a:extLst>
+              <a:ext uri="{FF2B5EF4-FFF2-40B4-BE49-F238E27FC236}">
+                <a16:creationId xmlns:a16="http://schemas.microsoft.com/office/drawing/2014/main" id="{00A0E995-6A8F-59C3-FF25-E6352AFCAED0}"/>
+              </a:ext>
+            </a:extLst>
+          </p:cNvPr>
+          <p:cNvPicPr>
+            <a:picLocks noChangeAspect="1"/>
+          </p:cNvPicPr>
+          <p:nvPr/>
+        </p:nvPicPr>
+        <p:blipFill>
+          <a:blip r:embed="rId20"/>
+          <a:stretch>
+            <a:fillRect/>
+          </a:stretch>
+        </p:blipFill>
+        <p:spPr>
+          <a:xfrm rot="157431">
+            <a:off x="7904058" y="3379899"/>
+            <a:ext cx="283326" cy="443794"/>
+          </a:xfrm>
+          <a:prstGeom prst="rect">
+            <a:avLst/>
+          </a:prstGeom>
+        </p:spPr>
+      </p:pic>
+      <p:grpSp>
+        <p:nvGrpSpPr>
+          <p:cNvPr id="64" name="Grupo 63">
+            <a:extLst>
+              <a:ext uri="{FF2B5EF4-FFF2-40B4-BE49-F238E27FC236}">
+                <a16:creationId xmlns:a16="http://schemas.microsoft.com/office/drawing/2014/main" id="{441BE447-B975-C6E9-2831-0124E775EDB9}"/>
+              </a:ext>
+            </a:extLst>
+          </p:cNvPr>
+          <p:cNvGrpSpPr/>
+          <p:nvPr/>
+        </p:nvGrpSpPr>
+        <p:grpSpPr>
+          <a:xfrm>
+            <a:off x="7935562" y="4587594"/>
+            <a:ext cx="663950" cy="550264"/>
+            <a:chOff x="7992055" y="4655844"/>
+            <a:chExt cx="663950" cy="550264"/>
+          </a:xfrm>
+        </p:grpSpPr>
+        <p:sp>
+          <p:nvSpPr>
+            <p:cNvPr id="65" name="Flecha: curvada hacia abajo 64">
+              <a:extLst>
+                <a:ext uri="{FF2B5EF4-FFF2-40B4-BE49-F238E27FC236}">
+                  <a16:creationId xmlns:a16="http://schemas.microsoft.com/office/drawing/2014/main" id="{464D39B0-D5C6-7159-C0CC-04984F33B805}"/>
+                </a:ext>
+              </a:extLst>
+            </p:cNvPr>
+            <p:cNvSpPr/>
+            <p:nvPr/>
+          </p:nvSpPr>
+          <p:spPr>
+            <a:xfrm rot="3187469">
+              <a:off x="8253074" y="4747701"/>
+              <a:ext cx="416560" cy="232845"/>
+            </a:xfrm>
+            <a:prstGeom prst="curvedDownArrow">
+              <a:avLst/>
+            </a:prstGeom>
+          </p:spPr>
+          <p:style>
+            <a:lnRef idx="2">
+              <a:schemeClr val="accent1">
+                <a:shade val="50000"/>
+              </a:schemeClr>
+            </a:lnRef>
+            <a:fillRef idx="1">
+              <a:schemeClr val="accent1"/>
+            </a:fillRef>
+            <a:effectRef idx="0">
+              <a:schemeClr val="accent1"/>
+            </a:effectRef>
+            <a:fontRef idx="minor">
+              <a:schemeClr val="lt1"/>
+            </a:fontRef>
+          </p:style>
+          <p:txBody>
+            <a:bodyPr rtlCol="0" anchor="ctr"/>
+            <a:lstStyle/>
+            <a:p>
+              <a:pPr algn="ctr"/>
+              <a:endParaRPr lang="es-MX">
+                <a:solidFill>
+                  <a:schemeClr val="tx1"/>
+                </a:solidFill>
+              </a:endParaRPr>
+            </a:p>
+          </p:txBody>
+        </p:sp>
+        <p:sp>
+          <p:nvSpPr>
+            <p:cNvPr id="66" name="Flecha: curvada hacia abajo 65">
+              <a:extLst>
+                <a:ext uri="{FF2B5EF4-FFF2-40B4-BE49-F238E27FC236}">
+                  <a16:creationId xmlns:a16="http://schemas.microsoft.com/office/drawing/2014/main" id="{D2E0B506-BFF8-1F3C-3D40-0CE1B562DBFA}"/>
+                </a:ext>
+              </a:extLst>
+            </p:cNvPr>
+            <p:cNvSpPr/>
+            <p:nvPr/>
+          </p:nvSpPr>
+          <p:spPr>
+            <a:xfrm rot="14656350">
+              <a:off x="7965809" y="4881405"/>
+              <a:ext cx="416560" cy="232845"/>
+            </a:xfrm>
+            <a:prstGeom prst="curvedDownArrow">
+              <a:avLst/>
+            </a:prstGeom>
+          </p:spPr>
+          <p:style>
+            <a:lnRef idx="2">
+              <a:schemeClr val="accent1">
+                <a:shade val="50000"/>
+              </a:schemeClr>
+            </a:lnRef>
+            <a:fillRef idx="1">
+              <a:schemeClr val="accent1"/>
+            </a:fillRef>
+            <a:effectRef idx="0">
+              <a:schemeClr val="accent1"/>
+            </a:effectRef>
+            <a:fontRef idx="minor">
+              <a:schemeClr val="lt1"/>
+            </a:fontRef>
+          </p:style>
+          <p:txBody>
+            <a:bodyPr rtlCol="0" anchor="ctr"/>
+            <a:lstStyle/>
+            <a:p>
+              <a:pPr algn="ctr"/>
+              <a:endParaRPr lang="es-MX">
+                <a:solidFill>
+                  <a:schemeClr val="tx1"/>
+                </a:solidFill>
+              </a:endParaRPr>
+            </a:p>
+          </p:txBody>
+        </p:sp>
+        <p:sp>
+          <p:nvSpPr>
+            <p:cNvPr id="67" name="Rectángulo 66">
+              <a:extLst>
+                <a:ext uri="{FF2B5EF4-FFF2-40B4-BE49-F238E27FC236}">
+                  <a16:creationId xmlns:a16="http://schemas.microsoft.com/office/drawing/2014/main" id="{EF0979B1-B861-4E84-8DE2-053CA8E8209E}"/>
+                </a:ext>
+              </a:extLst>
+            </p:cNvPr>
+            <p:cNvSpPr/>
+            <p:nvPr/>
+          </p:nvSpPr>
+          <p:spPr>
+            <a:xfrm rot="19990860">
+              <a:off x="8380258" y="5051594"/>
+              <a:ext cx="63302" cy="63302"/>
+            </a:xfrm>
+            <a:prstGeom prst="rect">
+              <a:avLst/>
+            </a:prstGeom>
+          </p:spPr>
+          <p:style>
+            <a:lnRef idx="2">
+              <a:schemeClr val="accent1">
+                <a:shade val="50000"/>
+              </a:schemeClr>
+            </a:lnRef>
+            <a:fillRef idx="1">
+              <a:schemeClr val="accent1"/>
+            </a:fillRef>
+            <a:effectRef idx="0">
+              <a:schemeClr val="accent1"/>
+            </a:effectRef>
+            <a:fontRef idx="minor">
+              <a:schemeClr val="lt1"/>
+            </a:fontRef>
+          </p:style>
+          <p:txBody>
+            <a:bodyPr rtlCol="0" anchor="ctr"/>
+            <a:lstStyle/>
+            <a:p>
+              <a:pPr algn="ctr"/>
+              <a:endParaRPr lang="es-MX"/>
+            </a:p>
+          </p:txBody>
+        </p:sp>
+        <p:grpSp>
+          <p:nvGrpSpPr>
+            <p:cNvPr id="68" name="Grupo 67">
+              <a:extLst>
+                <a:ext uri="{FF2B5EF4-FFF2-40B4-BE49-F238E27FC236}">
+                  <a16:creationId xmlns:a16="http://schemas.microsoft.com/office/drawing/2014/main" id="{8A480A62-D725-CA39-6CA1-767B4C5B9066}"/>
+                </a:ext>
+              </a:extLst>
+            </p:cNvPr>
+            <p:cNvGrpSpPr/>
+            <p:nvPr/>
+          </p:nvGrpSpPr>
+          <p:grpSpPr>
+            <a:xfrm rot="19602821">
+              <a:off x="7992055" y="4756102"/>
+              <a:ext cx="663950" cy="344959"/>
+              <a:chOff x="10446969" y="5174945"/>
+              <a:chExt cx="663950" cy="344959"/>
+            </a:xfrm>
+          </p:grpSpPr>
+          <p:sp>
+            <p:nvSpPr>
+              <p:cNvPr id="69" name="CuadroTexto 68">
+                <a:extLst>
+                  <a:ext uri="{FF2B5EF4-FFF2-40B4-BE49-F238E27FC236}">
+                    <a16:creationId xmlns:a16="http://schemas.microsoft.com/office/drawing/2014/main" id="{149FF7C9-7335-71AA-0F44-E3F324D20C74}"/>
+                  </a:ext>
+                </a:extLst>
+              </p:cNvPr>
+              <p:cNvSpPr txBox="1"/>
+              <p:nvPr/>
+            </p:nvSpPr>
+            <p:spPr>
+              <a:xfrm rot="21482985">
+                <a:off x="10480118" y="5174945"/>
+                <a:ext cx="469891" cy="253916"/>
+              </a:xfrm>
+              <a:prstGeom prst="rect">
+                <a:avLst/>
+              </a:prstGeom>
+              <a:noFill/>
+            </p:spPr>
+            <p:txBody>
+              <a:bodyPr wrap="square" rtlCol="0">
+                <a:spAutoFit/>
+              </a:bodyPr>
+              <a:lstStyle/>
+              <a:p>
+                <a:pPr algn="ctr"/>
+                <a:r>
+                  <a:rPr lang="es-MX" sz="1050" b="1" spc="100" dirty="0">
+                    <a:solidFill>
+                      <a:schemeClr val="tx1"/>
+                    </a:solidFill>
+                    <a:effectLst>
+                      <a:outerShdw blurRad="38100" dist="38100" dir="2700000" algn="tl">
+                        <a:srgbClr val="000000">
+                          <a:alpha val="43137"/>
+                        </a:srgbClr>
+                      </a:outerShdw>
+                    </a:effectLst>
+                    <a:latin typeface="Agency FB" panose="020B0503020202020204" pitchFamily="34" charset="0"/>
+                  </a:rPr>
+                  <a:t>Gaia</a:t>
+                </a:r>
+                <a:endParaRPr lang="es-MX" sz="900" b="1" spc="100" dirty="0">
+                  <a:solidFill>
+                    <a:schemeClr val="tx1"/>
+                  </a:solidFill>
+                  <a:effectLst>
+                    <a:outerShdw blurRad="38100" dist="38100" dir="2700000" algn="tl">
+                      <a:srgbClr val="000000">
+                        <a:alpha val="43137"/>
+                      </a:srgbClr>
+                    </a:outerShdw>
+                  </a:effectLst>
+                  <a:latin typeface="Agency FB" panose="020B0503020202020204" pitchFamily="34" charset="0"/>
+                </a:endParaRPr>
+              </a:p>
+            </p:txBody>
+          </p:sp>
+          <p:sp>
+            <p:nvSpPr>
+              <p:cNvPr id="70" name="CuadroTexto 69">
+                <a:extLst>
+                  <a:ext uri="{FF2B5EF4-FFF2-40B4-BE49-F238E27FC236}">
+                    <a16:creationId xmlns:a16="http://schemas.microsoft.com/office/drawing/2014/main" id="{5D724B93-5889-590C-0671-CDF12A41CA62}"/>
+                  </a:ext>
+                </a:extLst>
+              </p:cNvPr>
+              <p:cNvSpPr txBox="1"/>
+              <p:nvPr/>
+            </p:nvSpPr>
+            <p:spPr>
+              <a:xfrm rot="21518147">
+                <a:off x="10446969" y="5273683"/>
+                <a:ext cx="663950" cy="246221"/>
+              </a:xfrm>
+              <a:prstGeom prst="rect">
+                <a:avLst/>
+              </a:prstGeom>
+              <a:noFill/>
+            </p:spPr>
+            <p:txBody>
+              <a:bodyPr wrap="square" rtlCol="0">
+                <a:spAutoFit/>
+              </a:bodyPr>
+              <a:lstStyle/>
+              <a:p>
+                <a:pPr algn="ctr"/>
+                <a:r>
+                  <a:rPr lang="es-MX" sz="1000" spc="50" dirty="0" err="1">
+                    <a:solidFill>
+                      <a:schemeClr val="tx1"/>
+                    </a:solidFill>
+                    <a:effectLst>
+                      <a:outerShdw blurRad="38100" dist="38100" dir="2700000" algn="tl">
+                        <a:srgbClr val="000000">
+                          <a:alpha val="43137"/>
+                        </a:srgbClr>
+                      </a:outerShdw>
+                    </a:effectLst>
+                    <a:latin typeface="Agency FB" panose="020B0503020202020204" pitchFamily="34" charset="0"/>
+                  </a:rPr>
+                  <a:t>inside</a:t>
+                </a:r>
+                <a:endParaRPr lang="es-MX" sz="700" spc="50" dirty="0">
+                  <a:solidFill>
+                    <a:schemeClr val="tx1"/>
+                  </a:solidFill>
+                  <a:effectLst>
+                    <a:outerShdw blurRad="38100" dist="38100" dir="2700000" algn="tl">
+                      <a:srgbClr val="000000">
+                        <a:alpha val="43137"/>
+                      </a:srgbClr>
+                    </a:outerShdw>
+                  </a:effectLst>
+                  <a:latin typeface="Agency FB" panose="020B0503020202020204" pitchFamily="34" charset="0"/>
+                </a:endParaRPr>
+              </a:p>
+            </p:txBody>
+          </p:sp>
+        </p:grpSp>
+      </p:grpSp>
+    </p:spTree>
+    <p:extLst>
+      <p:ext uri="{BB962C8B-B14F-4D97-AF65-F5344CB8AC3E}">
+        <p14:creationId xmlns:p14="http://schemas.microsoft.com/office/powerpoint/2010/main" val="3727799641"/>
+      </p:ext>
+    </p:extLst>
+  </p:cSld>
+  <p:clrMapOvr>
+    <a:masterClrMapping/>
+  </p:clrMapOvr>
+</p:sld>
+</file>
+
+<file path=ppt/slides/slide11.xml><?xml version="1.0" encoding="utf-8"?>
+<p:sld xmlns:a="http://schemas.openxmlformats.org/drawingml/2006/main" xmlns:r="http://schemas.openxmlformats.org/officeDocument/2006/relationships" xmlns:p="http://schemas.openxmlformats.org/presentationml/2006/main">
+  <p:cSld>
+    <p:spTree>
+      <p:nvGrpSpPr>
+        <p:cNvPr id="1" name=""/>
+        <p:cNvGrpSpPr/>
+        <p:nvPr/>
+      </p:nvGrpSpPr>
+      <p:grpSpPr>
+        <a:xfrm>
+          <a:off x="0" y="0"/>
+          <a:ext cx="0" cy="0"/>
+          <a:chOff x="0" y="0"/>
+          <a:chExt cx="0" cy="0"/>
+        </a:xfrm>
+      </p:grpSpPr>
+      <p:sp>
+        <p:nvSpPr>
+          <p:cNvPr id="4" name="Rectángulo: esquinas redondeadas 3">
+            <a:extLst>
+              <a:ext uri="{FF2B5EF4-FFF2-40B4-BE49-F238E27FC236}">
+                <a16:creationId xmlns:a16="http://schemas.microsoft.com/office/drawing/2014/main" id="{A9D7B28F-BD9D-63F6-579B-5BEAB5A034AD}"/>
+              </a:ext>
+            </a:extLst>
+          </p:cNvPr>
+          <p:cNvSpPr/>
+          <p:nvPr/>
+        </p:nvSpPr>
+        <p:spPr>
+          <a:xfrm>
+            <a:off x="3036000" y="1269000"/>
+            <a:ext cx="6120000" cy="4320000"/>
+          </a:xfrm>
+          <a:prstGeom prst="roundRect">
+            <a:avLst>
+              <a:gd name="adj" fmla="val 5638"/>
+            </a:avLst>
+          </a:prstGeom>
+          <a:solidFill>
+            <a:schemeClr val="bg1">
+              <a:lumMod val="95000"/>
+            </a:schemeClr>
+          </a:solidFill>
+          <a:ln>
+            <a:solidFill>
+              <a:schemeClr val="bg1">
+                <a:lumMod val="75000"/>
+              </a:schemeClr>
+            </a:solidFill>
+          </a:ln>
+        </p:spPr>
+        <p:style>
+          <a:lnRef idx="2">
+            <a:schemeClr val="accent1">
+              <a:shade val="50000"/>
+            </a:schemeClr>
+          </a:lnRef>
+          <a:fillRef idx="1">
+            <a:schemeClr val="accent1"/>
+          </a:fillRef>
+          <a:effectRef idx="0">
+            <a:schemeClr val="accent1"/>
+          </a:effectRef>
+          <a:fontRef idx="minor">
+            <a:schemeClr val="lt1"/>
+          </a:fontRef>
+        </p:style>
+        <p:txBody>
+          <a:bodyPr rtlCol="0" anchor="ctr"/>
+          <a:lstStyle/>
+          <a:p>
+            <a:pPr algn="ctr"/>
+            <a:endParaRPr lang="es-MX"/>
+          </a:p>
+        </p:txBody>
+      </p:sp>
+      <p:sp>
+        <p:nvSpPr>
+          <p:cNvPr id="5" name="Rectángulo 4">
+            <a:extLst>
+              <a:ext uri="{FF2B5EF4-FFF2-40B4-BE49-F238E27FC236}">
+                <a16:creationId xmlns:a16="http://schemas.microsoft.com/office/drawing/2014/main" id="{21AFBC58-EF75-6DAA-CF87-DBF568E10F59}"/>
+              </a:ext>
+            </a:extLst>
+          </p:cNvPr>
+          <p:cNvSpPr/>
+          <p:nvPr/>
+        </p:nvSpPr>
+        <p:spPr>
+          <a:xfrm>
+            <a:off x="3306000" y="1539000"/>
+            <a:ext cx="5580000" cy="3780000"/>
+          </a:xfrm>
+          <a:prstGeom prst="rect">
+            <a:avLst/>
+          </a:prstGeom>
+          <a:solidFill>
+            <a:schemeClr val="bg1">
+              <a:lumMod val="95000"/>
+            </a:schemeClr>
+          </a:solidFill>
+        </p:spPr>
+        <p:style>
+          <a:lnRef idx="2">
+            <a:schemeClr val="accent1">
+              <a:shade val="50000"/>
+            </a:schemeClr>
+          </a:lnRef>
+          <a:fillRef idx="1">
+            <a:schemeClr val="accent1"/>
+          </a:fillRef>
+          <a:effectRef idx="0">
+            <a:schemeClr val="accent1"/>
+          </a:effectRef>
+          <a:fontRef idx="minor">
+            <a:schemeClr val="lt1"/>
+          </a:fontRef>
+        </p:style>
+        <p:txBody>
+          <a:bodyPr rtlCol="0" anchor="ctr"/>
+          <a:lstStyle/>
+          <a:p>
+            <a:pPr algn="ctr"/>
+            <a:endParaRPr lang="es-MX" dirty="0"/>
+          </a:p>
+        </p:txBody>
+      </p:sp>
+      <p:pic>
+        <p:nvPicPr>
+          <p:cNvPr id="6" name="Marcador de posición de contenido 5">
+            <a:extLst>
+              <a:ext uri="{FF2B5EF4-FFF2-40B4-BE49-F238E27FC236}">
+                <a16:creationId xmlns:a16="http://schemas.microsoft.com/office/drawing/2014/main" id="{0033AF28-464A-0F85-EF8E-177D89BDAAC4}"/>
+              </a:ext>
+            </a:extLst>
+          </p:cNvPr>
+          <p:cNvPicPr>
+            <a:picLocks noGrp="1" noChangeAspect="1"/>
+          </p:cNvPicPr>
+          <p:nvPr/>
+        </p:nvPicPr>
+        <p:blipFill>
+          <a:blip r:embed="rId2"/>
+          <a:stretch>
+            <a:fillRect/>
+          </a:stretch>
+        </p:blipFill>
+        <p:spPr>
+          <a:xfrm>
+            <a:off x="3582440" y="2774135"/>
+            <a:ext cx="2777315" cy="654866"/>
+          </a:xfrm>
+          <a:prstGeom prst="rect">
+            <a:avLst/>
+          </a:prstGeom>
           <a:effectLst>
             <a:outerShdw blurRad="50800" dist="38100" dir="2700000" algn="tl" rotWithShape="0">
               <a:prstClr val="black">
@@ -17355,7 +18508,7 @@
 </p:sld>
 </file>
 
-<file path=ppt/slides/slide11.xml><?xml version="1.0" encoding="utf-8"?>
+<file path=ppt/slides/slide12.xml><?xml version="1.0" encoding="utf-8"?>
 <p:sld xmlns:a="http://schemas.openxmlformats.org/drawingml/2006/main" xmlns:r="http://schemas.openxmlformats.org/officeDocument/2006/relationships" xmlns:p="http://schemas.openxmlformats.org/presentationml/2006/main">
   <p:cSld>
     <p:spTree>
@@ -20422,7 +21575,7 @@
 </p:sld>
 </file>
 
-<file path=ppt/slides/slide12.xml><?xml version="1.0" encoding="utf-8"?>
+<file path=ppt/slides/slide13.xml><?xml version="1.0" encoding="utf-8"?>
 <p:sld xmlns:a="http://schemas.openxmlformats.org/drawingml/2006/main" xmlns:r="http://schemas.openxmlformats.org/officeDocument/2006/relationships" xmlns:p="http://schemas.openxmlformats.org/presentationml/2006/main">
   <p:cSld>
     <p:spTree>
@@ -24883,6 +26036,1343 @@
         <p:cNvPr id="1" name="">
           <a:extLst>
             <a:ext uri="{FF2B5EF4-FFF2-40B4-BE49-F238E27FC236}">
+              <a16:creationId xmlns:a16="http://schemas.microsoft.com/office/drawing/2014/main" id="{922E21F4-0601-0D31-8FAE-302C00AD6826}"/>
+            </a:ext>
+          </a:extLst>
+        </p:cNvPr>
+        <p:cNvGrpSpPr/>
+        <p:nvPr/>
+      </p:nvGrpSpPr>
+      <p:grpSpPr>
+        <a:xfrm>
+          <a:off x="0" y="0"/>
+          <a:ext cx="0" cy="0"/>
+          <a:chOff x="0" y="0"/>
+          <a:chExt cx="0" cy="0"/>
+        </a:xfrm>
+      </p:grpSpPr>
+      <p:sp>
+        <p:nvSpPr>
+          <p:cNvPr id="4" name="Rectángulo: esquinas redondeadas 3">
+            <a:extLst>
+              <a:ext uri="{FF2B5EF4-FFF2-40B4-BE49-F238E27FC236}">
+                <a16:creationId xmlns:a16="http://schemas.microsoft.com/office/drawing/2014/main" id="{DF1CDCEA-73E4-57E1-1550-538A34995FE9}"/>
+              </a:ext>
+            </a:extLst>
+          </p:cNvPr>
+          <p:cNvSpPr/>
+          <p:nvPr/>
+        </p:nvSpPr>
+        <p:spPr>
+          <a:xfrm>
+            <a:off x="3036000" y="1269000"/>
+            <a:ext cx="6120000" cy="4320000"/>
+          </a:xfrm>
+          <a:prstGeom prst="roundRect">
+            <a:avLst>
+              <a:gd name="adj" fmla="val 5638"/>
+            </a:avLst>
+          </a:prstGeom>
+          <a:solidFill>
+            <a:schemeClr val="bg1">
+              <a:lumMod val="95000"/>
+            </a:schemeClr>
+          </a:solidFill>
+          <a:ln>
+            <a:solidFill>
+              <a:schemeClr val="bg1">
+                <a:lumMod val="75000"/>
+              </a:schemeClr>
+            </a:solidFill>
+          </a:ln>
+        </p:spPr>
+        <p:style>
+          <a:lnRef idx="2">
+            <a:schemeClr val="accent1">
+              <a:shade val="50000"/>
+            </a:schemeClr>
+          </a:lnRef>
+          <a:fillRef idx="1">
+            <a:schemeClr val="accent1"/>
+          </a:fillRef>
+          <a:effectRef idx="0">
+            <a:schemeClr val="accent1"/>
+          </a:effectRef>
+          <a:fontRef idx="minor">
+            <a:schemeClr val="lt1"/>
+          </a:fontRef>
+        </p:style>
+        <p:txBody>
+          <a:bodyPr rtlCol="0" anchor="ctr"/>
+          <a:lstStyle/>
+          <a:p>
+            <a:pPr algn="ctr"/>
+            <a:endParaRPr lang="es-MX"/>
+          </a:p>
+        </p:txBody>
+      </p:sp>
+      <p:sp>
+        <p:nvSpPr>
+          <p:cNvPr id="5" name="Rectángulo 4">
+            <a:extLst>
+              <a:ext uri="{FF2B5EF4-FFF2-40B4-BE49-F238E27FC236}">
+                <a16:creationId xmlns:a16="http://schemas.microsoft.com/office/drawing/2014/main" id="{E27B5C46-9EDA-3DAC-F586-7342F2269252}"/>
+              </a:ext>
+            </a:extLst>
+          </p:cNvPr>
+          <p:cNvSpPr/>
+          <p:nvPr/>
+        </p:nvSpPr>
+        <p:spPr>
+          <a:xfrm>
+            <a:off x="3306000" y="1539000"/>
+            <a:ext cx="5580000" cy="3780000"/>
+          </a:xfrm>
+          <a:prstGeom prst="rect">
+            <a:avLst/>
+          </a:prstGeom>
+          <a:solidFill>
+            <a:schemeClr val="bg1">
+              <a:lumMod val="95000"/>
+            </a:schemeClr>
+          </a:solidFill>
+        </p:spPr>
+        <p:style>
+          <a:lnRef idx="2">
+            <a:schemeClr val="accent1">
+              <a:shade val="50000"/>
+            </a:schemeClr>
+          </a:lnRef>
+          <a:fillRef idx="1">
+            <a:schemeClr val="accent1"/>
+          </a:fillRef>
+          <a:effectRef idx="0">
+            <a:schemeClr val="accent1"/>
+          </a:effectRef>
+          <a:fontRef idx="minor">
+            <a:schemeClr val="lt1"/>
+          </a:fontRef>
+        </p:style>
+        <p:txBody>
+          <a:bodyPr rtlCol="0" anchor="ctr"/>
+          <a:lstStyle/>
+          <a:p>
+            <a:pPr algn="ctr"/>
+            <a:endParaRPr lang="es-MX" dirty="0"/>
+          </a:p>
+        </p:txBody>
+      </p:sp>
+      <p:pic>
+        <p:nvPicPr>
+          <p:cNvPr id="6" name="Marcador de posición de contenido 5">
+            <a:extLst>
+              <a:ext uri="{FF2B5EF4-FFF2-40B4-BE49-F238E27FC236}">
+                <a16:creationId xmlns:a16="http://schemas.microsoft.com/office/drawing/2014/main" id="{BEED46CF-3D2C-657F-7A71-89D7B47017EA}"/>
+              </a:ext>
+            </a:extLst>
+          </p:cNvPr>
+          <p:cNvPicPr>
+            <a:picLocks noGrp="1" noChangeAspect="1"/>
+          </p:cNvPicPr>
+          <p:nvPr/>
+        </p:nvPicPr>
+        <p:blipFill>
+          <a:blip r:embed="rId2"/>
+          <a:stretch>
+            <a:fillRect/>
+          </a:stretch>
+        </p:blipFill>
+        <p:spPr>
+          <a:xfrm>
+            <a:off x="3582440" y="2774135"/>
+            <a:ext cx="2777315" cy="654866"/>
+          </a:xfrm>
+          <a:prstGeom prst="rect">
+            <a:avLst/>
+          </a:prstGeom>
+          <a:effectLst/>
+        </p:spPr>
+      </p:pic>
+      <p:cxnSp>
+        <p:nvCxnSpPr>
+          <p:cNvPr id="7" name="Conector recto 6">
+            <a:extLst>
+              <a:ext uri="{FF2B5EF4-FFF2-40B4-BE49-F238E27FC236}">
+                <a16:creationId xmlns:a16="http://schemas.microsoft.com/office/drawing/2014/main" id="{1EAAAE50-60AF-FBE1-3083-0FD046F403E7}"/>
+              </a:ext>
+            </a:extLst>
+          </p:cNvPr>
+          <p:cNvCxnSpPr>
+            <a:cxnSpLocks/>
+          </p:cNvCxnSpPr>
+          <p:nvPr/>
+        </p:nvCxnSpPr>
+        <p:spPr>
+          <a:xfrm>
+            <a:off x="3582440" y="3425481"/>
+            <a:ext cx="4995336" cy="0"/>
+          </a:xfrm>
+          <a:prstGeom prst="line">
+            <a:avLst/>
+          </a:prstGeom>
+          <a:effectLst/>
+        </p:spPr>
+        <p:style>
+          <a:lnRef idx="3">
+            <a:schemeClr val="dk1"/>
+          </a:lnRef>
+          <a:fillRef idx="0">
+            <a:schemeClr val="dk1"/>
+          </a:fillRef>
+          <a:effectRef idx="2">
+            <a:schemeClr val="dk1"/>
+          </a:effectRef>
+          <a:fontRef idx="minor">
+            <a:schemeClr val="tx1"/>
+          </a:fontRef>
+        </p:style>
+      </p:cxnSp>
+      <p:pic>
+        <p:nvPicPr>
+          <p:cNvPr id="12" name="Imagen 11">
+            <a:extLst>
+              <a:ext uri="{FF2B5EF4-FFF2-40B4-BE49-F238E27FC236}">
+                <a16:creationId xmlns:a16="http://schemas.microsoft.com/office/drawing/2014/main" id="{CCD4D82A-9C23-8775-C00C-CECF2BC4AE73}"/>
+              </a:ext>
+            </a:extLst>
+          </p:cNvPr>
+          <p:cNvPicPr>
+            <a:picLocks noChangeAspect="1"/>
+          </p:cNvPicPr>
+          <p:nvPr/>
+        </p:nvPicPr>
+        <p:blipFill>
+          <a:blip r:embed="rId3">
+            <a:biLevel thresh="75000"/>
+          </a:blip>
+          <a:stretch>
+            <a:fillRect/>
+          </a:stretch>
+        </p:blipFill>
+        <p:spPr>
+          <a:xfrm>
+            <a:off x="5542198" y="1846635"/>
+            <a:ext cx="1107603" cy="1107603"/>
+          </a:xfrm>
+          <a:prstGeom prst="rect">
+            <a:avLst/>
+          </a:prstGeom>
+          <a:effectLst/>
+        </p:spPr>
+      </p:pic>
+      <p:sp>
+        <p:nvSpPr>
+          <p:cNvPr id="20" name="CuadroTexto 19">
+            <a:extLst>
+              <a:ext uri="{FF2B5EF4-FFF2-40B4-BE49-F238E27FC236}">
+                <a16:creationId xmlns:a16="http://schemas.microsoft.com/office/drawing/2014/main" id="{05ED2600-4AF9-916D-837B-53135CFC33E7}"/>
+              </a:ext>
+            </a:extLst>
+          </p:cNvPr>
+          <p:cNvSpPr txBox="1"/>
+          <p:nvPr/>
+        </p:nvSpPr>
+        <p:spPr>
+          <a:xfrm>
+            <a:off x="6374114" y="3432519"/>
+            <a:ext cx="2203662" cy="338554"/>
+          </a:xfrm>
+          <a:prstGeom prst="rect">
+            <a:avLst/>
+          </a:prstGeom>
+          <a:noFill/>
+          <a:effectLst/>
+        </p:spPr>
+        <p:txBody>
+          <a:bodyPr wrap="square" rtlCol="0">
+            <a:spAutoFit/>
+          </a:bodyPr>
+          <a:lstStyle/>
+          <a:p>
+            <a:pPr algn="r"/>
+            <a:r>
+              <a:rPr lang="es-MX" sz="1600" b="1" dirty="0">
+                <a:latin typeface="+mj-lt"/>
+              </a:rPr>
+              <a:t>Riego Inteligente</a:t>
+            </a:r>
+          </a:p>
+        </p:txBody>
+      </p:sp>
+      <p:sp>
+        <p:nvSpPr>
+          <p:cNvPr id="27" name="CuadroTexto 26">
+            <a:extLst>
+              <a:ext uri="{FF2B5EF4-FFF2-40B4-BE49-F238E27FC236}">
+                <a16:creationId xmlns:a16="http://schemas.microsoft.com/office/drawing/2014/main" id="{8AC08B62-492A-2291-D48A-9BAF06D742E3}"/>
+              </a:ext>
+            </a:extLst>
+          </p:cNvPr>
+          <p:cNvSpPr txBox="1"/>
+          <p:nvPr/>
+        </p:nvSpPr>
+        <p:spPr>
+          <a:xfrm>
+            <a:off x="4656837" y="4271449"/>
+            <a:ext cx="3137451" cy="892552"/>
+          </a:xfrm>
+          <a:prstGeom prst="rect">
+            <a:avLst/>
+          </a:prstGeom>
+          <a:noFill/>
+          <a:effectLst/>
+        </p:spPr>
+        <p:txBody>
+          <a:bodyPr wrap="square" rtlCol="0">
+            <a:spAutoFit/>
+          </a:bodyPr>
+          <a:lstStyle/>
+          <a:p>
+            <a:pPr marL="285750" indent="-285750" algn="r">
+              <a:spcAft>
+                <a:spcPts val="600"/>
+              </a:spcAft>
+              <a:buFont typeface="Wingdings" pitchFamily="2" charset="2"/>
+              <a:buChar char="ü"/>
+            </a:pPr>
+            <a:r>
+              <a:rPr lang="es-MX" sz="1400" i="1" dirty="0">
+                <a:latin typeface="+mj-lt"/>
+              </a:rPr>
+              <a:t>Gestión en tiempo real</a:t>
+            </a:r>
+          </a:p>
+          <a:p>
+            <a:pPr marL="285750" indent="-285750" algn="r">
+              <a:spcAft>
+                <a:spcPts val="600"/>
+              </a:spcAft>
+              <a:buFont typeface="Wingdings" pitchFamily="2" charset="2"/>
+              <a:buChar char="ü"/>
+            </a:pPr>
+            <a:r>
+              <a:rPr lang="es-MX" sz="1400" i="1" dirty="0">
+                <a:latin typeface="+mj-lt"/>
+              </a:rPr>
+              <a:t>Instalación sencilla y segura</a:t>
+            </a:r>
+          </a:p>
+          <a:p>
+            <a:pPr marL="285750" indent="-285750" algn="r">
+              <a:spcAft>
+                <a:spcPts val="600"/>
+              </a:spcAft>
+              <a:buFont typeface="Wingdings" pitchFamily="2" charset="2"/>
+              <a:buChar char="ü"/>
+            </a:pPr>
+            <a:r>
+              <a:rPr lang="es-MX" sz="1400" i="1" dirty="0">
+                <a:latin typeface="+mj-lt"/>
+              </a:rPr>
+              <a:t>Asistido por Inteligencia Artificial</a:t>
+            </a:r>
+          </a:p>
+        </p:txBody>
+      </p:sp>
+      <p:grpSp>
+        <p:nvGrpSpPr>
+          <p:cNvPr id="31" name="Grupo 30">
+            <a:extLst>
+              <a:ext uri="{FF2B5EF4-FFF2-40B4-BE49-F238E27FC236}">
+                <a16:creationId xmlns:a16="http://schemas.microsoft.com/office/drawing/2014/main" id="{CD0E43F9-3BF9-1A4C-387D-6822D7ACF8E5}"/>
+              </a:ext>
+            </a:extLst>
+          </p:cNvPr>
+          <p:cNvGrpSpPr>
+            <a:grpSpLocks noChangeAspect="1"/>
+          </p:cNvGrpSpPr>
+          <p:nvPr/>
+        </p:nvGrpSpPr>
+        <p:grpSpPr>
+          <a:xfrm>
+            <a:off x="7807998" y="4186760"/>
+            <a:ext cx="808668" cy="936000"/>
+            <a:chOff x="7985180" y="4239886"/>
+            <a:chExt cx="732859" cy="848255"/>
+          </a:xfrm>
+        </p:grpSpPr>
+        <p:sp>
+          <p:nvSpPr>
+            <p:cNvPr id="30" name="Elipse 29">
+              <a:extLst>
+                <a:ext uri="{FF2B5EF4-FFF2-40B4-BE49-F238E27FC236}">
+                  <a16:creationId xmlns:a16="http://schemas.microsoft.com/office/drawing/2014/main" id="{F1D71D85-45B4-6676-293F-8CDC91DE9F03}"/>
+                </a:ext>
+              </a:extLst>
+            </p:cNvPr>
+            <p:cNvSpPr/>
+            <p:nvPr/>
+          </p:nvSpPr>
+          <p:spPr>
+            <a:xfrm>
+              <a:off x="7985180" y="4355282"/>
+              <a:ext cx="732859" cy="732859"/>
+            </a:xfrm>
+            <a:prstGeom prst="ellipse">
+              <a:avLst/>
+            </a:prstGeom>
+            <a:solidFill>
+              <a:schemeClr val="accent6">
+                <a:lumMod val="40000"/>
+                <a:lumOff val="60000"/>
+              </a:schemeClr>
+            </a:solidFill>
+            <a:ln>
+              <a:noFill/>
+            </a:ln>
+          </p:spPr>
+          <p:style>
+            <a:lnRef idx="2">
+              <a:schemeClr val="accent1">
+                <a:shade val="15000"/>
+              </a:schemeClr>
+            </a:lnRef>
+            <a:fillRef idx="1">
+              <a:schemeClr val="accent1"/>
+            </a:fillRef>
+            <a:effectRef idx="0">
+              <a:schemeClr val="accent1"/>
+            </a:effectRef>
+            <a:fontRef idx="minor">
+              <a:schemeClr val="lt1"/>
+            </a:fontRef>
+          </p:style>
+          <p:txBody>
+            <a:bodyPr rtlCol="0" anchor="ctr"/>
+            <a:lstStyle/>
+            <a:p>
+              <a:pPr algn="ctr"/>
+              <a:endParaRPr lang="es-MX"/>
+            </a:p>
+          </p:txBody>
+        </p:sp>
+        <p:grpSp>
+          <p:nvGrpSpPr>
+            <p:cNvPr id="28" name="Grupo 27">
+              <a:extLst>
+                <a:ext uri="{FF2B5EF4-FFF2-40B4-BE49-F238E27FC236}">
+                  <a16:creationId xmlns:a16="http://schemas.microsoft.com/office/drawing/2014/main" id="{E3C0FB83-FFEA-3218-397A-881D5A26C605}"/>
+                </a:ext>
+              </a:extLst>
+            </p:cNvPr>
+            <p:cNvGrpSpPr/>
+            <p:nvPr/>
+          </p:nvGrpSpPr>
+          <p:grpSpPr>
+            <a:xfrm>
+              <a:off x="8119240" y="4239886"/>
+              <a:ext cx="537363" cy="805465"/>
+              <a:chOff x="9290616" y="4511050"/>
+              <a:chExt cx="313178" cy="469429"/>
+            </a:xfrm>
+          </p:grpSpPr>
+          <p:sp>
+            <p:nvSpPr>
+              <p:cNvPr id="11" name="Forma libre 10">
+                <a:extLst>
+                  <a:ext uri="{FF2B5EF4-FFF2-40B4-BE49-F238E27FC236}">
+                    <a16:creationId xmlns:a16="http://schemas.microsoft.com/office/drawing/2014/main" id="{9FC99F6E-7885-993C-F23B-EBAF3B2B269F}"/>
+                  </a:ext>
+                </a:extLst>
+              </p:cNvPr>
+              <p:cNvSpPr/>
+              <p:nvPr/>
+            </p:nvSpPr>
+            <p:spPr>
+              <a:xfrm>
+                <a:off x="9404880" y="4511050"/>
+                <a:ext cx="42325" cy="67109"/>
+              </a:xfrm>
+              <a:custGeom>
+                <a:avLst/>
+                <a:gdLst>
+                  <a:gd name="connsiteX0" fmla="*/ 6 w 42325"/>
+                  <a:gd name="connsiteY0" fmla="*/ 45463 h 67109"/>
+                  <a:gd name="connsiteX1" fmla="*/ 20683 w 42325"/>
+                  <a:gd name="connsiteY1" fmla="*/ 67104 h 67109"/>
+                  <a:gd name="connsiteX2" fmla="*/ 42324 w 42325"/>
+                  <a:gd name="connsiteY2" fmla="*/ 46426 h 67109"/>
+                  <a:gd name="connsiteX3" fmla="*/ 42325 w 42325"/>
+                  <a:gd name="connsiteY3" fmla="*/ 46358 h 67109"/>
+                  <a:gd name="connsiteX4" fmla="*/ 42325 w 42325"/>
+                  <a:gd name="connsiteY4" fmla="*/ 45463 h 67109"/>
+                  <a:gd name="connsiteX5" fmla="*/ 21161 w 42325"/>
+                  <a:gd name="connsiteY5" fmla="*/ 0 h 67109"/>
+                  <a:gd name="connsiteX6" fmla="*/ 6 w 42325"/>
+                  <a:gd name="connsiteY6" fmla="*/ 45463 h 67109"/>
+                </a:gdLst>
+                <a:ahLst/>
+                <a:cxnLst>
+                  <a:cxn ang="0">
+                    <a:pos x="connsiteX0" y="connsiteY0"/>
+                  </a:cxn>
+                  <a:cxn ang="0">
+                    <a:pos x="connsiteX1" y="connsiteY1"/>
+                  </a:cxn>
+                  <a:cxn ang="0">
+                    <a:pos x="connsiteX2" y="connsiteY2"/>
+                  </a:cxn>
+                  <a:cxn ang="0">
+                    <a:pos x="connsiteX3" y="connsiteY3"/>
+                  </a:cxn>
+                  <a:cxn ang="0">
+                    <a:pos x="connsiteX4" y="connsiteY4"/>
+                  </a:cxn>
+                  <a:cxn ang="0">
+                    <a:pos x="connsiteX5" y="connsiteY5"/>
+                  </a:cxn>
+                  <a:cxn ang="0">
+                    <a:pos x="connsiteX6" y="connsiteY6"/>
+                  </a:cxn>
+                </a:cxnLst>
+                <a:rect l="l" t="t" r="r" b="b"/>
+                <a:pathLst>
+                  <a:path w="42325" h="67109">
+                    <a:moveTo>
+                      <a:pt x="6" y="45463"/>
+                    </a:moveTo>
+                    <a:cubicBezTo>
+                      <a:pt x="-260" y="57149"/>
+                      <a:pt x="8997" y="66838"/>
+                      <a:pt x="20683" y="67104"/>
+                    </a:cubicBezTo>
+                    <a:cubicBezTo>
+                      <a:pt x="32369" y="67369"/>
+                      <a:pt x="42057" y="58112"/>
+                      <a:pt x="42324" y="46426"/>
+                    </a:cubicBezTo>
+                    <a:cubicBezTo>
+                      <a:pt x="42324" y="46404"/>
+                      <a:pt x="42325" y="46381"/>
+                      <a:pt x="42325" y="46358"/>
+                    </a:cubicBezTo>
+                    <a:cubicBezTo>
+                      <a:pt x="42325" y="46063"/>
+                      <a:pt x="42325" y="45758"/>
+                      <a:pt x="42325" y="45463"/>
+                    </a:cubicBezTo>
+                    <a:cubicBezTo>
+                      <a:pt x="42325" y="31404"/>
+                      <a:pt x="21161" y="0"/>
+                      <a:pt x="21161" y="0"/>
+                    </a:cubicBezTo>
+                    <a:cubicBezTo>
+                      <a:pt x="21161" y="0"/>
+                      <a:pt x="6" y="31318"/>
+                      <a:pt x="6" y="45463"/>
+                    </a:cubicBezTo>
+                    <a:close/>
+                  </a:path>
+                </a:pathLst>
+              </a:custGeom>
+              <a:solidFill>
+                <a:srgbClr val="4472C4"/>
+              </a:solidFill>
+              <a:ln w="9525" cap="flat">
+                <a:solidFill>
+                  <a:schemeClr val="bg1"/>
+                </a:solidFill>
+                <a:prstDash val="solid"/>
+                <a:miter/>
+              </a:ln>
+            </p:spPr>
+            <p:txBody>
+              <a:bodyPr rot="0" spcFirstLastPara="0" vertOverflow="overflow" horzOverflow="overflow" vert="horz" wrap="square" lIns="91440" tIns="45720" rIns="91440" bIns="45720" numCol="1" spcCol="0" rtlCol="0" fromWordArt="0" anchor="ctr" anchorCtr="0" forceAA="0" compatLnSpc="1">
+                <a:prstTxWarp prst="textNoShape">
+                  <a:avLst/>
+                </a:prstTxWarp>
+                <a:noAutofit/>
+              </a:bodyPr>
+              <a:lstStyle/>
+              <a:p>
+                <a:endParaRPr lang="es-MX"/>
+              </a:p>
+            </p:txBody>
+          </p:sp>
+          <p:sp>
+            <p:nvSpPr>
+              <p:cNvPr id="13" name="Forma libre 12">
+                <a:extLst>
+                  <a:ext uri="{FF2B5EF4-FFF2-40B4-BE49-F238E27FC236}">
+                    <a16:creationId xmlns:a16="http://schemas.microsoft.com/office/drawing/2014/main" id="{C45BF56A-98C0-FC94-094A-9B03A616A315}"/>
+                  </a:ext>
+                </a:extLst>
+              </p:cNvPr>
+              <p:cNvSpPr/>
+              <p:nvPr/>
+            </p:nvSpPr>
+            <p:spPr>
+              <a:xfrm>
+                <a:off x="9335820" y="4567867"/>
+                <a:ext cx="42329" cy="66636"/>
+              </a:xfrm>
+              <a:custGeom>
+                <a:avLst/>
+                <a:gdLst>
+                  <a:gd name="connsiteX0" fmla="*/ 21165 w 42329"/>
+                  <a:gd name="connsiteY0" fmla="*/ 66618 h 66636"/>
+                  <a:gd name="connsiteX1" fmla="*/ 42329 w 42329"/>
+                  <a:gd name="connsiteY1" fmla="*/ 45453 h 66636"/>
+                  <a:gd name="connsiteX2" fmla="*/ 42329 w 42329"/>
+                  <a:gd name="connsiteY2" fmla="*/ 45453 h 66636"/>
+                  <a:gd name="connsiteX3" fmla="*/ 21165 w 42329"/>
+                  <a:gd name="connsiteY3" fmla="*/ 0 h 66636"/>
+                  <a:gd name="connsiteX4" fmla="*/ 0 w 42329"/>
+                  <a:gd name="connsiteY4" fmla="*/ 45453 h 66636"/>
+                  <a:gd name="connsiteX5" fmla="*/ 21145 w 42329"/>
+                  <a:gd name="connsiteY5" fmla="*/ 66637 h 66636"/>
+                </a:gdLst>
+                <a:ahLst/>
+                <a:cxnLst>
+                  <a:cxn ang="0">
+                    <a:pos x="connsiteX0" y="connsiteY0"/>
+                  </a:cxn>
+                  <a:cxn ang="0">
+                    <a:pos x="connsiteX1" y="connsiteY1"/>
+                  </a:cxn>
+                  <a:cxn ang="0">
+                    <a:pos x="connsiteX2" y="connsiteY2"/>
+                  </a:cxn>
+                  <a:cxn ang="0">
+                    <a:pos x="connsiteX3" y="connsiteY3"/>
+                  </a:cxn>
+                  <a:cxn ang="0">
+                    <a:pos x="connsiteX4" y="connsiteY4"/>
+                  </a:cxn>
+                  <a:cxn ang="0">
+                    <a:pos x="connsiteX5" y="connsiteY5"/>
+                  </a:cxn>
+                </a:cxnLst>
+                <a:rect l="l" t="t" r="r" b="b"/>
+                <a:pathLst>
+                  <a:path w="42329" h="66636">
+                    <a:moveTo>
+                      <a:pt x="21165" y="66618"/>
+                    </a:moveTo>
+                    <a:cubicBezTo>
+                      <a:pt x="32854" y="66618"/>
+                      <a:pt x="42329" y="57142"/>
+                      <a:pt x="42329" y="45453"/>
+                    </a:cubicBezTo>
+                    <a:lnTo>
+                      <a:pt x="42329" y="45453"/>
+                    </a:lnTo>
+                    <a:cubicBezTo>
+                      <a:pt x="42329" y="31404"/>
+                      <a:pt x="21165" y="0"/>
+                      <a:pt x="21165" y="0"/>
+                    </a:cubicBezTo>
+                    <a:cubicBezTo>
+                      <a:pt x="21165" y="0"/>
+                      <a:pt x="0" y="31318"/>
+                      <a:pt x="0" y="45453"/>
+                    </a:cubicBezTo>
+                    <a:cubicBezTo>
+                      <a:pt x="-10" y="57142"/>
+                      <a:pt x="9456" y="66626"/>
+                      <a:pt x="21145" y="66637"/>
+                    </a:cubicBezTo>
+                    <a:close/>
+                  </a:path>
+                </a:pathLst>
+              </a:custGeom>
+              <a:solidFill>
+                <a:srgbClr val="4472C4"/>
+              </a:solidFill>
+              <a:ln w="9525" cap="flat">
+                <a:solidFill>
+                  <a:schemeClr val="bg1"/>
+                </a:solidFill>
+                <a:prstDash val="solid"/>
+                <a:miter/>
+              </a:ln>
+            </p:spPr>
+            <p:txBody>
+              <a:bodyPr rtlCol="0" anchor="ctr"/>
+              <a:lstStyle/>
+              <a:p>
+                <a:endParaRPr lang="es-MX"/>
+              </a:p>
+            </p:txBody>
+          </p:sp>
+          <p:sp>
+            <p:nvSpPr>
+              <p:cNvPr id="14" name="Forma libre 13">
+                <a:extLst>
+                  <a:ext uri="{FF2B5EF4-FFF2-40B4-BE49-F238E27FC236}">
+                    <a16:creationId xmlns:a16="http://schemas.microsoft.com/office/drawing/2014/main" id="{DC40525A-A5FF-43A4-1218-88FE0962CD02}"/>
+                  </a:ext>
+                </a:extLst>
+              </p:cNvPr>
+              <p:cNvSpPr/>
+              <p:nvPr/>
+            </p:nvSpPr>
+            <p:spPr>
+              <a:xfrm>
+                <a:off x="9457610" y="4598528"/>
+                <a:ext cx="42341" cy="67722"/>
+              </a:xfrm>
+              <a:custGeom>
+                <a:avLst/>
+                <a:gdLst>
+                  <a:gd name="connsiteX0" fmla="*/ 21171 w 42341"/>
+                  <a:gd name="connsiteY0" fmla="*/ 67723 h 67722"/>
+                  <a:gd name="connsiteX1" fmla="*/ 42335 w 42341"/>
+                  <a:gd name="connsiteY1" fmla="*/ 45463 h 67722"/>
+                  <a:gd name="connsiteX2" fmla="*/ 21171 w 42341"/>
+                  <a:gd name="connsiteY2" fmla="*/ 0 h 67722"/>
+                  <a:gd name="connsiteX3" fmla="*/ 6 w 42341"/>
+                  <a:gd name="connsiteY3" fmla="*/ 45463 h 67722"/>
+                  <a:gd name="connsiteX4" fmla="*/ 21171 w 42341"/>
+                  <a:gd name="connsiteY4" fmla="*/ 67723 h 67722"/>
+                </a:gdLst>
+                <a:ahLst/>
+                <a:cxnLst>
+                  <a:cxn ang="0">
+                    <a:pos x="connsiteX0" y="connsiteY0"/>
+                  </a:cxn>
+                  <a:cxn ang="0">
+                    <a:pos x="connsiteX1" y="connsiteY1"/>
+                  </a:cxn>
+                  <a:cxn ang="0">
+                    <a:pos x="connsiteX2" y="connsiteY2"/>
+                  </a:cxn>
+                  <a:cxn ang="0">
+                    <a:pos x="connsiteX3" y="connsiteY3"/>
+                  </a:cxn>
+                  <a:cxn ang="0">
+                    <a:pos x="connsiteX4" y="connsiteY4"/>
+                  </a:cxn>
+                </a:cxnLst>
+                <a:rect l="l" t="t" r="r" b="b"/>
+                <a:pathLst>
+                  <a:path w="42341" h="67722">
+                    <a:moveTo>
+                      <a:pt x="21171" y="67723"/>
+                    </a:moveTo>
+                    <a:cubicBezTo>
+                      <a:pt x="33153" y="67401"/>
+                      <a:pt x="42618" y="57446"/>
+                      <a:pt x="42335" y="45463"/>
+                    </a:cubicBezTo>
+                    <a:cubicBezTo>
+                      <a:pt x="42335" y="31404"/>
+                      <a:pt x="21171" y="0"/>
+                      <a:pt x="21171" y="0"/>
+                    </a:cubicBezTo>
+                    <a:cubicBezTo>
+                      <a:pt x="21171" y="0"/>
+                      <a:pt x="6" y="31328"/>
+                      <a:pt x="6" y="45463"/>
+                    </a:cubicBezTo>
+                    <a:cubicBezTo>
+                      <a:pt x="-277" y="57446"/>
+                      <a:pt x="9188" y="67401"/>
+                      <a:pt x="21171" y="67723"/>
+                    </a:cubicBezTo>
+                    <a:close/>
+                  </a:path>
+                </a:pathLst>
+              </a:custGeom>
+              <a:solidFill>
+                <a:srgbClr val="4472C4"/>
+              </a:solidFill>
+              <a:ln w="9525" cap="flat">
+                <a:solidFill>
+                  <a:schemeClr val="bg1"/>
+                </a:solidFill>
+                <a:prstDash val="solid"/>
+                <a:miter/>
+              </a:ln>
+            </p:spPr>
+            <p:txBody>
+              <a:bodyPr rot="0" spcFirstLastPara="0" vertOverflow="overflow" horzOverflow="overflow" vert="horz" wrap="square" lIns="91440" tIns="45720" rIns="91440" bIns="45720" numCol="1" spcCol="0" rtlCol="0" fromWordArt="0" anchor="ctr" anchorCtr="0" forceAA="0" compatLnSpc="1">
+                <a:prstTxWarp prst="textNoShape">
+                  <a:avLst/>
+                </a:prstTxWarp>
+                <a:noAutofit/>
+              </a:bodyPr>
+              <a:lstStyle/>
+              <a:p>
+                <a:endParaRPr lang="es-MX"/>
+              </a:p>
+            </p:txBody>
+          </p:sp>
+          <p:sp>
+            <p:nvSpPr>
+              <p:cNvPr id="16" name="Forma libre 15">
+                <a:extLst>
+                  <a:ext uri="{FF2B5EF4-FFF2-40B4-BE49-F238E27FC236}">
+                    <a16:creationId xmlns:a16="http://schemas.microsoft.com/office/drawing/2014/main" id="{42489C46-3610-EA71-E627-C23B9DB2DADD}"/>
+                  </a:ext>
+                </a:extLst>
+              </p:cNvPr>
+              <p:cNvSpPr>
+                <a:spLocks noChangeAspect="1"/>
+              </p:cNvSpPr>
+              <p:nvPr/>
+            </p:nvSpPr>
+            <p:spPr>
+              <a:xfrm>
+                <a:off x="9290616" y="4665190"/>
+                <a:ext cx="313178" cy="315289"/>
+              </a:xfrm>
+              <a:custGeom>
+                <a:avLst/>
+                <a:gdLst>
+                  <a:gd name="connsiteX0" fmla="*/ 223893 w 313178"/>
+                  <a:gd name="connsiteY0" fmla="*/ 260532 h 315289"/>
+                  <a:gd name="connsiteX1" fmla="*/ 166390 w 313178"/>
+                  <a:gd name="connsiteY1" fmla="*/ 239081 h 315289"/>
+                  <a:gd name="connsiteX2" fmla="*/ 150493 w 313178"/>
+                  <a:gd name="connsiteY2" fmla="*/ 240386 h 315289"/>
+                  <a:gd name="connsiteX3" fmla="*/ 150493 w 313178"/>
+                  <a:gd name="connsiteY3" fmla="*/ 194724 h 315289"/>
+                  <a:gd name="connsiteX4" fmla="*/ 182107 w 313178"/>
+                  <a:gd name="connsiteY4" fmla="*/ 139888 h 315289"/>
+                  <a:gd name="connsiteX5" fmla="*/ 182449 w 313178"/>
+                  <a:gd name="connsiteY5" fmla="*/ 139536 h 315289"/>
+                  <a:gd name="connsiteX6" fmla="*/ 201576 w 313178"/>
+                  <a:gd name="connsiteY6" fmla="*/ 140098 h 315289"/>
+                  <a:gd name="connsiteX7" fmla="*/ 282919 w 313178"/>
+                  <a:gd name="connsiteY7" fmla="*/ 113342 h 315289"/>
+                  <a:gd name="connsiteX8" fmla="*/ 312180 w 313178"/>
+                  <a:gd name="connsiteY8" fmla="*/ 1004 h 315289"/>
+                  <a:gd name="connsiteX9" fmla="*/ 292682 w 313178"/>
+                  <a:gd name="connsiteY9" fmla="*/ 4 h 315289"/>
+                  <a:gd name="connsiteX10" fmla="*/ 201004 w 313178"/>
+                  <a:gd name="connsiteY10" fmla="*/ 30255 h 315289"/>
+                  <a:gd name="connsiteX11" fmla="*/ 170467 w 313178"/>
+                  <a:gd name="connsiteY11" fmla="*/ 124781 h 315289"/>
+                  <a:gd name="connsiteX12" fmla="*/ 137768 w 313178"/>
+                  <a:gd name="connsiteY12" fmla="*/ 163834 h 315289"/>
+                  <a:gd name="connsiteX13" fmla="*/ 135748 w 313178"/>
+                  <a:gd name="connsiteY13" fmla="*/ 161396 h 315289"/>
+                  <a:gd name="connsiteX14" fmla="*/ 131195 w 313178"/>
+                  <a:gd name="connsiteY14" fmla="*/ 155947 h 315289"/>
+                  <a:gd name="connsiteX15" fmla="*/ 110898 w 313178"/>
+                  <a:gd name="connsiteY15" fmla="*/ 77652 h 315289"/>
+                  <a:gd name="connsiteX16" fmla="*/ 40098 w 313178"/>
+                  <a:gd name="connsiteY16" fmla="*/ 52230 h 315289"/>
+                  <a:gd name="connsiteX17" fmla="*/ 19039 w 313178"/>
+                  <a:gd name="connsiteY17" fmla="*/ 53658 h 315289"/>
+                  <a:gd name="connsiteX18" fmla="*/ 43032 w 313178"/>
+                  <a:gd name="connsiteY18" fmla="*/ 145527 h 315289"/>
+                  <a:gd name="connsiteX19" fmla="*/ 113403 w 313178"/>
+                  <a:gd name="connsiteY19" fmla="*/ 170778 h 315289"/>
+                  <a:gd name="connsiteX20" fmla="*/ 118746 w 313178"/>
+                  <a:gd name="connsiteY20" fmla="*/ 170721 h 315289"/>
+                  <a:gd name="connsiteX21" fmla="*/ 121147 w 313178"/>
+                  <a:gd name="connsiteY21" fmla="*/ 173635 h 315289"/>
+                  <a:gd name="connsiteX22" fmla="*/ 131443 w 313178"/>
+                  <a:gd name="connsiteY22" fmla="*/ 195057 h 315289"/>
+                  <a:gd name="connsiteX23" fmla="*/ 131443 w 313178"/>
+                  <a:gd name="connsiteY23" fmla="*/ 245663 h 315289"/>
+                  <a:gd name="connsiteX24" fmla="*/ 108793 w 313178"/>
+                  <a:gd name="connsiteY24" fmla="*/ 260122 h 315289"/>
+                  <a:gd name="connsiteX25" fmla="*/ 1094 w 313178"/>
+                  <a:gd name="connsiteY25" fmla="*/ 301327 h 315289"/>
+                  <a:gd name="connsiteX26" fmla="*/ 5104 w 313178"/>
+                  <a:gd name="connsiteY26" fmla="*/ 314196 h 315289"/>
+                  <a:gd name="connsiteX27" fmla="*/ 17972 w 313178"/>
+                  <a:gd name="connsiteY27" fmla="*/ 310186 h 315289"/>
+                  <a:gd name="connsiteX28" fmla="*/ 107393 w 313178"/>
+                  <a:gd name="connsiteY28" fmla="*/ 280210 h 315289"/>
+                  <a:gd name="connsiteX29" fmla="*/ 114508 w 313178"/>
+                  <a:gd name="connsiteY29" fmla="*/ 283563 h 315289"/>
+                  <a:gd name="connsiteX30" fmla="*/ 119165 w 313178"/>
+                  <a:gd name="connsiteY30" fmla="*/ 277181 h 315289"/>
+                  <a:gd name="connsiteX31" fmla="*/ 212006 w 313178"/>
+                  <a:gd name="connsiteY31" fmla="*/ 275762 h 315289"/>
+                  <a:gd name="connsiteX32" fmla="*/ 215577 w 313178"/>
+                  <a:gd name="connsiteY32" fmla="*/ 279306 h 315289"/>
+                  <a:gd name="connsiteX33" fmla="*/ 219673 w 313178"/>
+                  <a:gd name="connsiteY33" fmla="*/ 279220 h 315289"/>
+                  <a:gd name="connsiteX34" fmla="*/ 271365 w 313178"/>
+                  <a:gd name="connsiteY34" fmla="*/ 310814 h 315289"/>
+                  <a:gd name="connsiteX35" fmla="*/ 284510 w 313178"/>
+                  <a:gd name="connsiteY35" fmla="*/ 313786 h 315289"/>
+                  <a:gd name="connsiteX36" fmla="*/ 287482 w 313178"/>
+                  <a:gd name="connsiteY36" fmla="*/ 300642 h 315289"/>
+                  <a:gd name="connsiteX37" fmla="*/ 223893 w 313178"/>
+                  <a:gd name="connsiteY37" fmla="*/ 260532 h 315289"/>
+                  <a:gd name="connsiteX38" fmla="*/ 214482 w 313178"/>
+                  <a:gd name="connsiteY38" fmla="*/ 43733 h 315289"/>
+                  <a:gd name="connsiteX39" fmla="*/ 292682 w 313178"/>
+                  <a:gd name="connsiteY39" fmla="*/ 19054 h 315289"/>
+                  <a:gd name="connsiteX40" fmla="*/ 294083 w 313178"/>
+                  <a:gd name="connsiteY40" fmla="*/ 19054 h 315289"/>
+                  <a:gd name="connsiteX41" fmla="*/ 269460 w 313178"/>
+                  <a:gd name="connsiteY41" fmla="*/ 99874 h 315289"/>
+                  <a:gd name="connsiteX42" fmla="*/ 201595 w 313178"/>
+                  <a:gd name="connsiteY42" fmla="*/ 121038 h 315289"/>
+                  <a:gd name="connsiteX43" fmla="*/ 189679 w 313178"/>
+                  <a:gd name="connsiteY43" fmla="*/ 120781 h 315289"/>
+                  <a:gd name="connsiteX44" fmla="*/ 214482 w 313178"/>
+                  <a:gd name="connsiteY44" fmla="*/ 43733 h 315289"/>
+                  <a:gd name="connsiteX45" fmla="*/ 112355 w 313178"/>
+                  <a:gd name="connsiteY45" fmla="*/ 151718 h 315289"/>
+                  <a:gd name="connsiteX46" fmla="*/ 56158 w 313178"/>
+                  <a:gd name="connsiteY46" fmla="*/ 131716 h 315289"/>
+                  <a:gd name="connsiteX47" fmla="*/ 37174 w 313178"/>
+                  <a:gd name="connsiteY47" fmla="*/ 71308 h 315289"/>
+                  <a:gd name="connsiteX48" fmla="*/ 40098 w 313178"/>
+                  <a:gd name="connsiteY48" fmla="*/ 71308 h 315289"/>
+                  <a:gd name="connsiteX49" fmla="*/ 96582 w 313178"/>
+                  <a:gd name="connsiteY49" fmla="*/ 90244 h 315289"/>
+                  <a:gd name="connsiteX50" fmla="*/ 112355 w 313178"/>
+                  <a:gd name="connsiteY50" fmla="*/ 151718 h 315289"/>
+                </a:gdLst>
+                <a:ahLst/>
+                <a:cxnLst>
+                  <a:cxn ang="0">
+                    <a:pos x="connsiteX0" y="connsiteY0"/>
+                  </a:cxn>
+                  <a:cxn ang="0">
+                    <a:pos x="connsiteX1" y="connsiteY1"/>
+                  </a:cxn>
+                  <a:cxn ang="0">
+                    <a:pos x="connsiteX2" y="connsiteY2"/>
+                  </a:cxn>
+                  <a:cxn ang="0">
+                    <a:pos x="connsiteX3" y="connsiteY3"/>
+                  </a:cxn>
+                  <a:cxn ang="0">
+                    <a:pos x="connsiteX4" y="connsiteY4"/>
+                  </a:cxn>
+                  <a:cxn ang="0">
+                    <a:pos x="connsiteX5" y="connsiteY5"/>
+                  </a:cxn>
+                  <a:cxn ang="0">
+                    <a:pos x="connsiteX6" y="connsiteY6"/>
+                  </a:cxn>
+                  <a:cxn ang="0">
+                    <a:pos x="connsiteX7" y="connsiteY7"/>
+                  </a:cxn>
+                  <a:cxn ang="0">
+                    <a:pos x="connsiteX8" y="connsiteY8"/>
+                  </a:cxn>
+                  <a:cxn ang="0">
+                    <a:pos x="connsiteX9" y="connsiteY9"/>
+                  </a:cxn>
+                  <a:cxn ang="0">
+                    <a:pos x="connsiteX10" y="connsiteY10"/>
+                  </a:cxn>
+                  <a:cxn ang="0">
+                    <a:pos x="connsiteX11" y="connsiteY11"/>
+                  </a:cxn>
+                  <a:cxn ang="0">
+                    <a:pos x="connsiteX12" y="connsiteY12"/>
+                  </a:cxn>
+                  <a:cxn ang="0">
+                    <a:pos x="connsiteX13" y="connsiteY13"/>
+                  </a:cxn>
+                  <a:cxn ang="0">
+                    <a:pos x="connsiteX14" y="connsiteY14"/>
+                  </a:cxn>
+                  <a:cxn ang="0">
+                    <a:pos x="connsiteX15" y="connsiteY15"/>
+                  </a:cxn>
+                  <a:cxn ang="0">
+                    <a:pos x="connsiteX16" y="connsiteY16"/>
+                  </a:cxn>
+                  <a:cxn ang="0">
+                    <a:pos x="connsiteX17" y="connsiteY17"/>
+                  </a:cxn>
+                  <a:cxn ang="0">
+                    <a:pos x="connsiteX18" y="connsiteY18"/>
+                  </a:cxn>
+                  <a:cxn ang="0">
+                    <a:pos x="connsiteX19" y="connsiteY19"/>
+                  </a:cxn>
+                  <a:cxn ang="0">
+                    <a:pos x="connsiteX20" y="connsiteY20"/>
+                  </a:cxn>
+                  <a:cxn ang="0">
+                    <a:pos x="connsiteX21" y="connsiteY21"/>
+                  </a:cxn>
+                  <a:cxn ang="0">
+                    <a:pos x="connsiteX22" y="connsiteY22"/>
+                  </a:cxn>
+                  <a:cxn ang="0">
+                    <a:pos x="connsiteX23" y="connsiteY23"/>
+                  </a:cxn>
+                  <a:cxn ang="0">
+                    <a:pos x="connsiteX24" y="connsiteY24"/>
+                  </a:cxn>
+                  <a:cxn ang="0">
+                    <a:pos x="connsiteX25" y="connsiteY25"/>
+                  </a:cxn>
+                  <a:cxn ang="0">
+                    <a:pos x="connsiteX26" y="connsiteY26"/>
+                  </a:cxn>
+                  <a:cxn ang="0">
+                    <a:pos x="connsiteX27" y="connsiteY27"/>
+                  </a:cxn>
+                  <a:cxn ang="0">
+                    <a:pos x="connsiteX28" y="connsiteY28"/>
+                  </a:cxn>
+                  <a:cxn ang="0">
+                    <a:pos x="connsiteX29" y="connsiteY29"/>
+                  </a:cxn>
+                  <a:cxn ang="0">
+                    <a:pos x="connsiteX30" y="connsiteY30"/>
+                  </a:cxn>
+                  <a:cxn ang="0">
+                    <a:pos x="connsiteX31" y="connsiteY31"/>
+                  </a:cxn>
+                  <a:cxn ang="0">
+                    <a:pos x="connsiteX32" y="connsiteY32"/>
+                  </a:cxn>
+                  <a:cxn ang="0">
+                    <a:pos x="connsiteX33" y="connsiteY33"/>
+                  </a:cxn>
+                  <a:cxn ang="0">
+                    <a:pos x="connsiteX34" y="connsiteY34"/>
+                  </a:cxn>
+                  <a:cxn ang="0">
+                    <a:pos x="connsiteX35" y="connsiteY35"/>
+                  </a:cxn>
+                  <a:cxn ang="0">
+                    <a:pos x="connsiteX36" y="connsiteY36"/>
+                  </a:cxn>
+                  <a:cxn ang="0">
+                    <a:pos x="connsiteX37" y="connsiteY37"/>
+                  </a:cxn>
+                  <a:cxn ang="0">
+                    <a:pos x="connsiteX38" y="connsiteY38"/>
+                  </a:cxn>
+                  <a:cxn ang="0">
+                    <a:pos x="connsiteX39" y="connsiteY39"/>
+                  </a:cxn>
+                  <a:cxn ang="0">
+                    <a:pos x="connsiteX40" y="connsiteY40"/>
+                  </a:cxn>
+                  <a:cxn ang="0">
+                    <a:pos x="connsiteX41" y="connsiteY41"/>
+                  </a:cxn>
+                  <a:cxn ang="0">
+                    <a:pos x="connsiteX42" y="connsiteY42"/>
+                  </a:cxn>
+                  <a:cxn ang="0">
+                    <a:pos x="connsiteX43" y="connsiteY43"/>
+                  </a:cxn>
+                  <a:cxn ang="0">
+                    <a:pos x="connsiteX44" y="connsiteY44"/>
+                  </a:cxn>
+                  <a:cxn ang="0">
+                    <a:pos x="connsiteX45" y="connsiteY45"/>
+                  </a:cxn>
+                  <a:cxn ang="0">
+                    <a:pos x="connsiteX46" y="connsiteY46"/>
+                  </a:cxn>
+                  <a:cxn ang="0">
+                    <a:pos x="connsiteX47" y="connsiteY47"/>
+                  </a:cxn>
+                  <a:cxn ang="0">
+                    <a:pos x="connsiteX48" y="connsiteY48"/>
+                  </a:cxn>
+                  <a:cxn ang="0">
+                    <a:pos x="connsiteX49" y="connsiteY49"/>
+                  </a:cxn>
+                  <a:cxn ang="0">
+                    <a:pos x="connsiteX50" y="connsiteY50"/>
+                  </a:cxn>
+                </a:cxnLst>
+                <a:rect l="l" t="t" r="r" b="b"/>
+                <a:pathLst>
+                  <a:path w="313178" h="315289">
+                    <a:moveTo>
+                      <a:pt x="223893" y="260532"/>
+                    </a:moveTo>
+                    <a:cubicBezTo>
+                      <a:pt x="208328" y="246039"/>
+                      <a:pt x="187644" y="238323"/>
+                      <a:pt x="166390" y="239081"/>
+                    </a:cubicBezTo>
+                    <a:cubicBezTo>
+                      <a:pt x="161065" y="239092"/>
+                      <a:pt x="155749" y="239528"/>
+                      <a:pt x="150493" y="240386"/>
+                    </a:cubicBezTo>
+                    <a:lnTo>
+                      <a:pt x="150493" y="194724"/>
+                    </a:lnTo>
+                    <a:cubicBezTo>
+                      <a:pt x="150811" y="172200"/>
+                      <a:pt x="162775" y="151450"/>
+                      <a:pt x="182107" y="139888"/>
+                    </a:cubicBezTo>
+                    <a:cubicBezTo>
+                      <a:pt x="182250" y="139793"/>
+                      <a:pt x="182316" y="139640"/>
+                      <a:pt x="182449" y="139536"/>
+                    </a:cubicBezTo>
+                    <a:cubicBezTo>
+                      <a:pt x="188164" y="139812"/>
+                      <a:pt x="194603" y="140098"/>
+                      <a:pt x="201576" y="140098"/>
+                    </a:cubicBezTo>
+                    <a:cubicBezTo>
+                      <a:pt x="227646" y="140098"/>
+                      <a:pt x="260164" y="136145"/>
+                      <a:pt x="282919" y="113342"/>
+                    </a:cubicBezTo>
+                    <a:cubicBezTo>
+                      <a:pt x="321543" y="73556"/>
+                      <a:pt x="312180" y="1004"/>
+                      <a:pt x="312180" y="1004"/>
+                    </a:cubicBezTo>
+                    <a:cubicBezTo>
+                      <a:pt x="305706" y="294"/>
+                      <a:pt x="299196" y="-41"/>
+                      <a:pt x="292682" y="4"/>
+                    </a:cubicBezTo>
+                    <a:cubicBezTo>
+                      <a:pt x="268422" y="4"/>
+                      <a:pt x="227017" y="4252"/>
+                      <a:pt x="201004" y="30255"/>
+                    </a:cubicBezTo>
+                    <a:cubicBezTo>
+                      <a:pt x="175591" y="56316"/>
+                      <a:pt x="170972" y="98035"/>
+                      <a:pt x="170467" y="124781"/>
+                    </a:cubicBezTo>
+                    <a:cubicBezTo>
+                      <a:pt x="156021" y="134364"/>
+                      <a:pt x="144663" y="147929"/>
+                      <a:pt x="137768" y="163834"/>
+                    </a:cubicBezTo>
+                    <a:cubicBezTo>
+                      <a:pt x="137091" y="163005"/>
+                      <a:pt x="136415" y="162186"/>
+                      <a:pt x="135748" y="161396"/>
+                    </a:cubicBezTo>
+                    <a:lnTo>
+                      <a:pt x="131195" y="155947"/>
+                    </a:lnTo>
+                    <a:cubicBezTo>
+                      <a:pt x="132481" y="134202"/>
+                      <a:pt x="132624" y="102407"/>
+                      <a:pt x="110898" y="77652"/>
+                    </a:cubicBezTo>
+                    <a:cubicBezTo>
+                      <a:pt x="92114" y="56240"/>
+                      <a:pt x="60853" y="52230"/>
+                      <a:pt x="40098" y="52230"/>
+                    </a:cubicBezTo>
+                    <a:cubicBezTo>
+                      <a:pt x="33053" y="52187"/>
+                      <a:pt x="26014" y="52664"/>
+                      <a:pt x="19039" y="53658"/>
+                    </a:cubicBezTo>
+                    <a:cubicBezTo>
+                      <a:pt x="19039" y="53658"/>
+                      <a:pt x="11104" y="115190"/>
+                      <a:pt x="43032" y="145527"/>
+                    </a:cubicBezTo>
+                    <a:cubicBezTo>
+                      <a:pt x="62042" y="163224"/>
+                      <a:pt x="87478" y="172351"/>
+                      <a:pt x="113403" y="170778"/>
+                    </a:cubicBezTo>
+                    <a:cubicBezTo>
+                      <a:pt x="115260" y="170778"/>
+                      <a:pt x="117003" y="170778"/>
+                      <a:pt x="118746" y="170721"/>
+                    </a:cubicBezTo>
+                    <a:cubicBezTo>
+                      <a:pt x="119546" y="171673"/>
+                      <a:pt x="120356" y="172692"/>
+                      <a:pt x="121147" y="173635"/>
+                    </a:cubicBezTo>
+                    <a:cubicBezTo>
+                      <a:pt x="126874" y="179426"/>
+                      <a:pt x="130498" y="186967"/>
+                      <a:pt x="131443" y="195057"/>
+                    </a:cubicBezTo>
+                    <a:lnTo>
+                      <a:pt x="131443" y="245663"/>
+                    </a:lnTo>
+                    <a:cubicBezTo>
+                      <a:pt x="122998" y="248913"/>
+                      <a:pt x="115295" y="253830"/>
+                      <a:pt x="108793" y="260122"/>
+                    </a:cubicBezTo>
+                    <a:cubicBezTo>
+                      <a:pt x="67639" y="244682"/>
+                      <a:pt x="21432" y="262361"/>
+                      <a:pt x="1094" y="301327"/>
+                    </a:cubicBezTo>
+                    <a:cubicBezTo>
+                      <a:pt x="-1353" y="305988"/>
+                      <a:pt x="443" y="311750"/>
+                      <a:pt x="5104" y="314196"/>
+                    </a:cubicBezTo>
+                    <a:cubicBezTo>
+                      <a:pt x="9764" y="316642"/>
+                      <a:pt x="15526" y="314846"/>
+                      <a:pt x="17972" y="310186"/>
+                    </a:cubicBezTo>
+                    <a:cubicBezTo>
+                      <a:pt x="34885" y="277793"/>
+                      <a:pt x="74373" y="264555"/>
+                      <a:pt x="107393" y="280210"/>
+                    </a:cubicBezTo>
+                    <a:lnTo>
+                      <a:pt x="114508" y="283563"/>
+                    </a:lnTo>
+                    <a:lnTo>
+                      <a:pt x="119165" y="277181"/>
+                    </a:lnTo>
+                    <a:cubicBezTo>
+                      <a:pt x="144895" y="252300"/>
+                      <a:pt x="185527" y="251679"/>
+                      <a:pt x="212006" y="275762"/>
+                    </a:cubicBezTo>
+                    <a:lnTo>
+                      <a:pt x="215577" y="279306"/>
+                    </a:lnTo>
+                    <a:lnTo>
+                      <a:pt x="219673" y="279220"/>
+                    </a:lnTo>
+                    <a:cubicBezTo>
+                      <a:pt x="240863" y="281190"/>
+                      <a:pt x="259949" y="292855"/>
+                      <a:pt x="271365" y="310814"/>
+                    </a:cubicBezTo>
+                    <a:cubicBezTo>
+                      <a:pt x="274174" y="315264"/>
+                      <a:pt x="280060" y="316595"/>
+                      <a:pt x="284510" y="313786"/>
+                    </a:cubicBezTo>
+                    <a:cubicBezTo>
+                      <a:pt x="288960" y="310977"/>
+                      <a:pt x="290291" y="305092"/>
+                      <a:pt x="287482" y="300642"/>
+                    </a:cubicBezTo>
+                    <a:cubicBezTo>
+                      <a:pt x="273346" y="278440"/>
+                      <a:pt x="250019" y="263726"/>
+                      <a:pt x="223893" y="260532"/>
+                    </a:cubicBezTo>
+                    <a:close/>
+                    <a:moveTo>
+                      <a:pt x="214482" y="43733"/>
+                    </a:moveTo>
+                    <a:cubicBezTo>
+                      <a:pt x="235951" y="22264"/>
+                      <a:pt x="272689" y="19054"/>
+                      <a:pt x="292682" y="19054"/>
+                    </a:cubicBezTo>
+                    <a:lnTo>
+                      <a:pt x="294083" y="19054"/>
+                    </a:lnTo>
+                    <a:cubicBezTo>
+                      <a:pt x="294216" y="40133"/>
+                      <a:pt x="291073" y="77614"/>
+                      <a:pt x="269460" y="99874"/>
+                    </a:cubicBezTo>
+                    <a:cubicBezTo>
+                      <a:pt x="255049" y="114313"/>
+                      <a:pt x="233484" y="121038"/>
+                      <a:pt x="201595" y="121038"/>
+                    </a:cubicBezTo>
+                    <a:cubicBezTo>
+                      <a:pt x="197461" y="121038"/>
+                      <a:pt x="193470" y="120933"/>
+                      <a:pt x="189679" y="120781"/>
+                    </a:cubicBezTo>
+                    <a:cubicBezTo>
+                      <a:pt x="191346" y="76918"/>
+                      <a:pt x="203785" y="54696"/>
+                      <a:pt x="214482" y="43733"/>
+                    </a:cubicBezTo>
+                    <a:close/>
+                    <a:moveTo>
+                      <a:pt x="112355" y="151718"/>
+                    </a:moveTo>
+                    <a:cubicBezTo>
+                      <a:pt x="91671" y="153042"/>
+                      <a:pt x="71353" y="145810"/>
+                      <a:pt x="56158" y="131716"/>
+                    </a:cubicBezTo>
+                    <a:cubicBezTo>
+                      <a:pt x="40918" y="117266"/>
+                      <a:pt x="37289" y="90101"/>
+                      <a:pt x="37174" y="71308"/>
+                    </a:cubicBezTo>
+                    <a:cubicBezTo>
+                      <a:pt x="38127" y="71308"/>
+                      <a:pt x="39079" y="71308"/>
+                      <a:pt x="40098" y="71308"/>
+                    </a:cubicBezTo>
+                    <a:cubicBezTo>
+                      <a:pt x="54995" y="71308"/>
+                      <a:pt x="82132" y="73775"/>
+                      <a:pt x="96582" y="90244"/>
+                    </a:cubicBezTo>
+                    <a:cubicBezTo>
+                      <a:pt x="112507" y="108370"/>
+                      <a:pt x="113279" y="132782"/>
+                      <a:pt x="112355" y="151718"/>
+                    </a:cubicBezTo>
+                    <a:close/>
+                  </a:path>
+                </a:pathLst>
+              </a:custGeom>
+              <a:solidFill>
+                <a:srgbClr val="000000"/>
+              </a:solidFill>
+              <a:ln w="9525" cap="flat">
+                <a:solidFill>
+                  <a:srgbClr val="00B050"/>
+                </a:solidFill>
+                <a:prstDash val="solid"/>
+                <a:miter/>
+              </a:ln>
+            </p:spPr>
+            <p:txBody>
+              <a:bodyPr rtlCol="0" anchor="ctr"/>
+              <a:lstStyle/>
+              <a:p>
+                <a:endParaRPr lang="es-MX"/>
+              </a:p>
+            </p:txBody>
+          </p:sp>
+        </p:grpSp>
+      </p:grpSp>
+    </p:spTree>
+    <p:extLst>
+      <p:ext uri="{BB962C8B-B14F-4D97-AF65-F5344CB8AC3E}">
+        <p14:creationId xmlns:p14="http://schemas.microsoft.com/office/powerpoint/2010/main" val="2692144162"/>
+      </p:ext>
+    </p:extLst>
+  </p:cSld>
+  <p:clrMapOvr>
+    <a:masterClrMapping/>
+  </p:clrMapOvr>
+</p:sld>
+</file>
+
+<file path=ppt/slides/slide4.xml><?xml version="1.0" encoding="utf-8"?>
+<p:sld xmlns:a="http://schemas.openxmlformats.org/drawingml/2006/main" xmlns:r="http://schemas.openxmlformats.org/officeDocument/2006/relationships" xmlns:p="http://schemas.openxmlformats.org/presentationml/2006/main">
+  <p:cSld>
+    <p:spTree>
+      <p:nvGrpSpPr>
+        <p:cNvPr id="1" name="">
+          <a:extLst>
+            <a:ext uri="{FF2B5EF4-FFF2-40B4-BE49-F238E27FC236}">
               <a16:creationId xmlns:a16="http://schemas.microsoft.com/office/drawing/2014/main" id="{4433DE8E-672A-B7D5-61EF-42D7993934BE}"/>
             </a:ext>
           </a:extLst>
@@ -25819,7 +28309,7 @@
 </p:sld>
 </file>
 
-<file path=ppt/slides/slide4.xml><?xml version="1.0" encoding="utf-8"?>
+<file path=ppt/slides/slide5.xml><?xml version="1.0" encoding="utf-8"?>
 <p:sld xmlns:a="http://schemas.openxmlformats.org/drawingml/2006/main" xmlns:r="http://schemas.openxmlformats.org/officeDocument/2006/relationships" xmlns:p="http://schemas.openxmlformats.org/presentationml/2006/main">
   <p:cSld>
     <p:spTree>
@@ -26672,7 +29162,7 @@
 </p:sld>
 </file>
 
-<file path=ppt/slides/slide5.xml><?xml version="1.0" encoding="utf-8"?>
+<file path=ppt/slides/slide6.xml><?xml version="1.0" encoding="utf-8"?>
 <p:sld xmlns:a="http://schemas.openxmlformats.org/drawingml/2006/main" xmlns:r="http://schemas.openxmlformats.org/officeDocument/2006/relationships" xmlns:p="http://schemas.openxmlformats.org/presentationml/2006/main">
   <p:cSld>
     <p:spTree>
@@ -27640,7 +30130,7 @@
 </p:sld>
 </file>
 
-<file path=ppt/slides/slide6.xml><?xml version="1.0" encoding="utf-8"?>
+<file path=ppt/slides/slide7.xml><?xml version="1.0" encoding="utf-8"?>
 <p:sld xmlns:a="http://schemas.openxmlformats.org/drawingml/2006/main" xmlns:r="http://schemas.openxmlformats.org/officeDocument/2006/relationships" xmlns:p="http://schemas.openxmlformats.org/presentationml/2006/main">
   <p:cSld>
     <p:spTree>
@@ -28517,7 +31007,7 @@
 </p:sld>
 </file>
 
-<file path=ppt/slides/slide7.xml><?xml version="1.0" encoding="utf-8"?>
+<file path=ppt/slides/slide8.xml><?xml version="1.0" encoding="utf-8"?>
 <p:sld xmlns:a="http://schemas.openxmlformats.org/drawingml/2006/main" xmlns:r="http://schemas.openxmlformats.org/officeDocument/2006/relationships" xmlns:p="http://schemas.openxmlformats.org/presentationml/2006/main">
   <p:cSld>
     <p:spTree>
@@ -29669,7 +32159,7 @@
 </p:sld>
 </file>
 
-<file path=ppt/slides/slide8.xml><?xml version="1.0" encoding="utf-8"?>
+<file path=ppt/slides/slide9.xml><?xml version="1.0" encoding="utf-8"?>
 <p:sld xmlns:a="http://schemas.openxmlformats.org/drawingml/2006/main" xmlns:r="http://schemas.openxmlformats.org/officeDocument/2006/relationships" xmlns:p="http://schemas.openxmlformats.org/presentationml/2006/main">
   <p:cSld>
     <p:spTree>
@@ -30821,1158 +33311,6 @@
 </p:sld>
 </file>
 
-<file path=ppt/slides/slide9.xml><?xml version="1.0" encoding="utf-8"?>
-<p:sld xmlns:a="http://schemas.openxmlformats.org/drawingml/2006/main" xmlns:r="http://schemas.openxmlformats.org/officeDocument/2006/relationships" xmlns:p="http://schemas.openxmlformats.org/presentationml/2006/main">
-  <p:cSld>
-    <p:spTree>
-      <p:nvGrpSpPr>
-        <p:cNvPr id="1" name=""/>
-        <p:cNvGrpSpPr/>
-        <p:nvPr/>
-      </p:nvGrpSpPr>
-      <p:grpSpPr>
-        <a:xfrm>
-          <a:off x="0" y="0"/>
-          <a:ext cx="0" cy="0"/>
-          <a:chOff x="0" y="0"/>
-          <a:chExt cx="0" cy="0"/>
-        </a:xfrm>
-      </p:grpSpPr>
-      <p:sp>
-        <p:nvSpPr>
-          <p:cNvPr id="4" name="Rectángulo: esquinas redondeadas 3">
-            <a:extLst>
-              <a:ext uri="{FF2B5EF4-FFF2-40B4-BE49-F238E27FC236}">
-                <a16:creationId xmlns:a16="http://schemas.microsoft.com/office/drawing/2014/main" id="{A9D7B28F-BD9D-63F6-579B-5BEAB5A034AD}"/>
-              </a:ext>
-            </a:extLst>
-          </p:cNvPr>
-          <p:cNvSpPr/>
-          <p:nvPr/>
-        </p:nvSpPr>
-        <p:spPr>
-          <a:xfrm>
-            <a:off x="3036000" y="1269000"/>
-            <a:ext cx="6120000" cy="4320000"/>
-          </a:xfrm>
-          <a:prstGeom prst="roundRect">
-            <a:avLst>
-              <a:gd name="adj" fmla="val 5638"/>
-            </a:avLst>
-          </a:prstGeom>
-          <a:solidFill>
-            <a:schemeClr val="bg1">
-              <a:lumMod val="95000"/>
-            </a:schemeClr>
-          </a:solidFill>
-          <a:ln>
-            <a:solidFill>
-              <a:schemeClr val="bg1">
-                <a:lumMod val="75000"/>
-              </a:schemeClr>
-            </a:solidFill>
-          </a:ln>
-        </p:spPr>
-        <p:style>
-          <a:lnRef idx="2">
-            <a:schemeClr val="accent1">
-              <a:shade val="50000"/>
-            </a:schemeClr>
-          </a:lnRef>
-          <a:fillRef idx="1">
-            <a:schemeClr val="accent1"/>
-          </a:fillRef>
-          <a:effectRef idx="0">
-            <a:schemeClr val="accent1"/>
-          </a:effectRef>
-          <a:fontRef idx="minor">
-            <a:schemeClr val="lt1"/>
-          </a:fontRef>
-        </p:style>
-        <p:txBody>
-          <a:bodyPr rtlCol="0" anchor="ctr"/>
-          <a:lstStyle/>
-          <a:p>
-            <a:pPr algn="ctr"/>
-            <a:endParaRPr lang="es-MX"/>
-          </a:p>
-        </p:txBody>
-      </p:sp>
-      <p:sp>
-        <p:nvSpPr>
-          <p:cNvPr id="5" name="Rectángulo 4">
-            <a:extLst>
-              <a:ext uri="{FF2B5EF4-FFF2-40B4-BE49-F238E27FC236}">
-                <a16:creationId xmlns:a16="http://schemas.microsoft.com/office/drawing/2014/main" id="{21AFBC58-EF75-6DAA-CF87-DBF568E10F59}"/>
-              </a:ext>
-            </a:extLst>
-          </p:cNvPr>
-          <p:cNvSpPr/>
-          <p:nvPr/>
-        </p:nvSpPr>
-        <p:spPr>
-          <a:xfrm>
-            <a:off x="3306000" y="1539000"/>
-            <a:ext cx="5580000" cy="3780000"/>
-          </a:xfrm>
-          <a:prstGeom prst="rect">
-            <a:avLst/>
-          </a:prstGeom>
-          <a:solidFill>
-            <a:schemeClr val="bg1">
-              <a:lumMod val="95000"/>
-            </a:schemeClr>
-          </a:solidFill>
-        </p:spPr>
-        <p:style>
-          <a:lnRef idx="2">
-            <a:schemeClr val="accent1">
-              <a:shade val="50000"/>
-            </a:schemeClr>
-          </a:lnRef>
-          <a:fillRef idx="1">
-            <a:schemeClr val="accent1"/>
-          </a:fillRef>
-          <a:effectRef idx="0">
-            <a:schemeClr val="accent1"/>
-          </a:effectRef>
-          <a:fontRef idx="minor">
-            <a:schemeClr val="lt1"/>
-          </a:fontRef>
-        </p:style>
-        <p:txBody>
-          <a:bodyPr rtlCol="0" anchor="ctr"/>
-          <a:lstStyle/>
-          <a:p>
-            <a:pPr algn="ctr"/>
-            <a:endParaRPr lang="es-MX" dirty="0"/>
-          </a:p>
-        </p:txBody>
-      </p:sp>
-      <p:pic>
-        <p:nvPicPr>
-          <p:cNvPr id="6" name="Marcador de posición de contenido 5">
-            <a:extLst>
-              <a:ext uri="{FF2B5EF4-FFF2-40B4-BE49-F238E27FC236}">
-                <a16:creationId xmlns:a16="http://schemas.microsoft.com/office/drawing/2014/main" id="{0033AF28-464A-0F85-EF8E-177D89BDAAC4}"/>
-              </a:ext>
-            </a:extLst>
-          </p:cNvPr>
-          <p:cNvPicPr>
-            <a:picLocks noGrp="1" noChangeAspect="1"/>
-          </p:cNvPicPr>
-          <p:nvPr/>
-        </p:nvPicPr>
-        <p:blipFill>
-          <a:blip r:embed="rId2"/>
-          <a:stretch>
-            <a:fillRect/>
-          </a:stretch>
-        </p:blipFill>
-        <p:spPr>
-          <a:xfrm>
-            <a:off x="3582440" y="2774135"/>
-            <a:ext cx="2777315" cy="654866"/>
-          </a:xfrm>
-          <a:prstGeom prst="rect">
-            <a:avLst/>
-          </a:prstGeom>
-          <a:effectLst/>
-        </p:spPr>
-      </p:pic>
-      <p:cxnSp>
-        <p:nvCxnSpPr>
-          <p:cNvPr id="7" name="Conector recto 6">
-            <a:extLst>
-              <a:ext uri="{FF2B5EF4-FFF2-40B4-BE49-F238E27FC236}">
-                <a16:creationId xmlns:a16="http://schemas.microsoft.com/office/drawing/2014/main" id="{7A4799EA-F15E-4CB2-8F51-85A3E43A3101}"/>
-              </a:ext>
-            </a:extLst>
-          </p:cNvPr>
-          <p:cNvCxnSpPr>
-            <a:cxnSpLocks/>
-          </p:cNvCxnSpPr>
-          <p:nvPr/>
-        </p:nvCxnSpPr>
-        <p:spPr>
-          <a:xfrm>
-            <a:off x="3582440" y="3425481"/>
-            <a:ext cx="4995336" cy="0"/>
-          </a:xfrm>
-          <a:prstGeom prst="line">
-            <a:avLst/>
-          </a:prstGeom>
-          <a:effectLst>
-            <a:outerShdw blurRad="50800" dist="38100" dir="2700000" algn="tl" rotWithShape="0">
-              <a:prstClr val="black">
-                <a:alpha val="40000"/>
-              </a:prstClr>
-            </a:outerShdw>
-          </a:effectLst>
-        </p:spPr>
-        <p:style>
-          <a:lnRef idx="3">
-            <a:schemeClr val="dk1"/>
-          </a:lnRef>
-          <a:fillRef idx="0">
-            <a:schemeClr val="dk1"/>
-          </a:fillRef>
-          <a:effectRef idx="2">
-            <a:schemeClr val="dk1"/>
-          </a:effectRef>
-          <a:fontRef idx="minor">
-            <a:schemeClr val="tx1"/>
-          </a:fontRef>
-        </p:style>
-      </p:cxnSp>
-      <p:sp>
-        <p:nvSpPr>
-          <p:cNvPr id="8" name="CuadroTexto 7">
-            <a:extLst>
-              <a:ext uri="{FF2B5EF4-FFF2-40B4-BE49-F238E27FC236}">
-                <a16:creationId xmlns:a16="http://schemas.microsoft.com/office/drawing/2014/main" id="{81D89563-FAE7-D3FC-AE0A-C2705F84D05B}"/>
-              </a:ext>
-            </a:extLst>
-          </p:cNvPr>
-          <p:cNvSpPr txBox="1"/>
-          <p:nvPr/>
-        </p:nvSpPr>
-        <p:spPr>
-          <a:xfrm>
-            <a:off x="5622326" y="3432519"/>
-            <a:ext cx="2955450" cy="338554"/>
-          </a:xfrm>
-          <a:prstGeom prst="rect">
-            <a:avLst/>
-          </a:prstGeom>
-          <a:noFill/>
-        </p:spPr>
-        <p:txBody>
-          <a:bodyPr wrap="square" rtlCol="0">
-            <a:spAutoFit/>
-          </a:bodyPr>
-          <a:lstStyle/>
-          <a:p>
-            <a:pPr algn="r"/>
-            <a:r>
-              <a:rPr lang="es-MX" sz="1600" i="1" dirty="0">
-                <a:effectLst>
-                  <a:outerShdw blurRad="38100" dist="38100" dir="2700000" algn="tl">
-                    <a:srgbClr val="000000">
-                      <a:alpha val="43137"/>
-                    </a:srgbClr>
-                  </a:outerShdw>
-                </a:effectLst>
-                <a:latin typeface="Agency FB" panose="020B0503020202020204" pitchFamily="34" charset="0"/>
-              </a:rPr>
-              <a:t>Movimiento continuo Serie Pv66      treme</a:t>
-            </a:r>
-          </a:p>
-        </p:txBody>
-      </p:sp>
-      <p:pic>
-        <p:nvPicPr>
-          <p:cNvPr id="12" name="Imagen 11">
-            <a:extLst>
-              <a:ext uri="{FF2B5EF4-FFF2-40B4-BE49-F238E27FC236}">
-                <a16:creationId xmlns:a16="http://schemas.microsoft.com/office/drawing/2014/main" id="{75CBA1C0-B9F8-D397-E74E-7065802A6C84}"/>
-              </a:ext>
-            </a:extLst>
-          </p:cNvPr>
-          <p:cNvPicPr>
-            <a:picLocks noChangeAspect="1"/>
-          </p:cNvPicPr>
-          <p:nvPr/>
-        </p:nvPicPr>
-        <p:blipFill>
-          <a:blip r:embed="rId3">
-            <a:biLevel thresh="75000"/>
-          </a:blip>
-          <a:stretch>
-            <a:fillRect/>
-          </a:stretch>
-        </p:blipFill>
-        <p:spPr>
-          <a:xfrm>
-            <a:off x="5542198" y="1846635"/>
-            <a:ext cx="1107603" cy="1107603"/>
-          </a:xfrm>
-          <a:prstGeom prst="rect">
-            <a:avLst/>
-          </a:prstGeom>
-          <a:effectLst>
-            <a:outerShdw blurRad="50800" dist="38100" dir="2700000" algn="tl" rotWithShape="0">
-              <a:prstClr val="black">
-                <a:alpha val="40000"/>
-              </a:prstClr>
-            </a:outerShdw>
-          </a:effectLst>
-        </p:spPr>
-      </p:pic>
-      <p:sp>
-        <p:nvSpPr>
-          <p:cNvPr id="24" name="Elipse 23" descr="Satélite con relleno sólido">
-            <a:extLst>
-              <a:ext uri="{FF2B5EF4-FFF2-40B4-BE49-F238E27FC236}">
-                <a16:creationId xmlns:a16="http://schemas.microsoft.com/office/drawing/2014/main" id="{2DA7B772-128A-1DEA-DEB1-41463FF8CFB5}"/>
-              </a:ext>
-            </a:extLst>
-          </p:cNvPr>
-          <p:cNvSpPr/>
-          <p:nvPr/>
-        </p:nvSpPr>
-        <p:spPr>
-          <a:xfrm>
-            <a:off x="6135223" y="4655680"/>
-            <a:ext cx="421131" cy="421131"/>
-          </a:xfrm>
-          <a:prstGeom prst="ellipse">
-            <a:avLst/>
-          </a:prstGeom>
-          <a:blipFill dpi="0" rotWithShape="1">
-            <a:blip r:embed="rId4">
-              <a:extLst>
-                <a:ext uri="{96DAC541-7B7A-43D3-8B79-37D633B846F1}">
-                  <asvg:svgBlip xmlns:asvg="http://schemas.microsoft.com/office/drawing/2016/SVG/main" r:embed="rId5"/>
-                </a:ext>
-              </a:extLst>
-            </a:blip>
-            <a:srcRect/>
-            <a:stretch>
-              <a:fillRect/>
-            </a:stretch>
-          </a:blipFill>
-          <a:ln w="19050">
-            <a:solidFill>
-              <a:schemeClr val="tx1"/>
-            </a:solidFill>
-          </a:ln>
-        </p:spPr>
-        <p:style>
-          <a:lnRef idx="2">
-            <a:schemeClr val="accent1">
-              <a:shade val="50000"/>
-            </a:schemeClr>
-          </a:lnRef>
-          <a:fillRef idx="1">
-            <a:schemeClr val="accent1"/>
-          </a:fillRef>
-          <a:effectRef idx="0">
-            <a:schemeClr val="accent1"/>
-          </a:effectRef>
-          <a:fontRef idx="minor">
-            <a:schemeClr val="lt1"/>
-          </a:fontRef>
-        </p:style>
-        <p:txBody>
-          <a:bodyPr rtlCol="0" anchor="ctr"/>
-          <a:lstStyle/>
-          <a:p>
-            <a:pPr algn="ctr"/>
-            <a:endParaRPr lang="es-MX"/>
-          </a:p>
-        </p:txBody>
-      </p:sp>
-      <p:sp>
-        <p:nvSpPr>
-          <p:cNvPr id="26" name="Elipse 25" descr="Satélite con relleno sólido">
-            <a:extLst>
-              <a:ext uri="{FF2B5EF4-FFF2-40B4-BE49-F238E27FC236}">
-                <a16:creationId xmlns:a16="http://schemas.microsoft.com/office/drawing/2014/main" id="{C72A8453-DB18-5128-53A1-EBA23F20F0D1}"/>
-              </a:ext>
-            </a:extLst>
-          </p:cNvPr>
-          <p:cNvSpPr/>
-          <p:nvPr/>
-        </p:nvSpPr>
-        <p:spPr>
-          <a:xfrm>
-            <a:off x="5622326" y="4655680"/>
-            <a:ext cx="421131" cy="421131"/>
-          </a:xfrm>
-          <a:prstGeom prst="ellipse">
-            <a:avLst/>
-          </a:prstGeom>
-          <a:blipFill dpi="0" rotWithShape="1">
-            <a:blip r:embed="rId6">
-              <a:extLst>
-                <a:ext uri="{28A0092B-C50C-407E-A947-70E740481C1C}">
-                  <a14:useLocalDpi xmlns:a14="http://schemas.microsoft.com/office/drawing/2010/main" val="0"/>
-                </a:ext>
-                <a:ext uri="{96DAC541-7B7A-43D3-8B79-37D633B846F1}">
-                  <asvg:svgBlip xmlns:asvg="http://schemas.microsoft.com/office/drawing/2016/SVG/main" r:embed="rId7"/>
-                </a:ext>
-              </a:extLst>
-            </a:blip>
-            <a:srcRect/>
-            <a:stretch>
-              <a:fillRect/>
-            </a:stretch>
-          </a:blipFill>
-          <a:ln w="19050">
-            <a:solidFill>
-              <a:schemeClr val="tx1"/>
-            </a:solidFill>
-          </a:ln>
-        </p:spPr>
-        <p:style>
-          <a:lnRef idx="2">
-            <a:schemeClr val="accent1">
-              <a:shade val="50000"/>
-            </a:schemeClr>
-          </a:lnRef>
-          <a:fillRef idx="1">
-            <a:schemeClr val="accent1"/>
-          </a:fillRef>
-          <a:effectRef idx="0">
-            <a:schemeClr val="accent1"/>
-          </a:effectRef>
-          <a:fontRef idx="minor">
-            <a:schemeClr val="lt1"/>
-          </a:fontRef>
-        </p:style>
-        <p:txBody>
-          <a:bodyPr rtlCol="0" anchor="ctr"/>
-          <a:lstStyle/>
-          <a:p>
-            <a:pPr algn="ctr"/>
-            <a:endParaRPr lang="es-MX"/>
-          </a:p>
-        </p:txBody>
-      </p:sp>
-      <p:sp>
-        <p:nvSpPr>
-          <p:cNvPr id="27" name="Elipse 26" descr="Satélite con relleno sólido">
-            <a:extLst>
-              <a:ext uri="{FF2B5EF4-FFF2-40B4-BE49-F238E27FC236}">
-                <a16:creationId xmlns:a16="http://schemas.microsoft.com/office/drawing/2014/main" id="{8F5AA977-B07F-5EFC-5201-C23E3F8600E0}"/>
-              </a:ext>
-            </a:extLst>
-          </p:cNvPr>
-          <p:cNvSpPr/>
-          <p:nvPr/>
-        </p:nvSpPr>
-        <p:spPr>
-          <a:xfrm>
-            <a:off x="4596532" y="4655680"/>
-            <a:ext cx="421131" cy="421131"/>
-          </a:xfrm>
-          <a:prstGeom prst="ellipse">
-            <a:avLst/>
-          </a:prstGeom>
-          <a:blipFill dpi="0" rotWithShape="1">
-            <a:blip r:embed="rId8">
-              <a:extLst>
-                <a:ext uri="{96DAC541-7B7A-43D3-8B79-37D633B846F1}">
-                  <asvg:svgBlip xmlns:asvg="http://schemas.microsoft.com/office/drawing/2016/SVG/main" r:embed="rId9"/>
-                </a:ext>
-              </a:extLst>
-            </a:blip>
-            <a:srcRect/>
-            <a:stretch>
-              <a:fillRect/>
-            </a:stretch>
-          </a:blipFill>
-          <a:ln w="19050">
-            <a:solidFill>
-              <a:schemeClr val="tx1"/>
-            </a:solidFill>
-          </a:ln>
-        </p:spPr>
-        <p:style>
-          <a:lnRef idx="2">
-            <a:schemeClr val="accent1">
-              <a:shade val="50000"/>
-            </a:schemeClr>
-          </a:lnRef>
-          <a:fillRef idx="1">
-            <a:schemeClr val="accent1"/>
-          </a:fillRef>
-          <a:effectRef idx="0">
-            <a:schemeClr val="accent1"/>
-          </a:effectRef>
-          <a:fontRef idx="minor">
-            <a:schemeClr val="lt1"/>
-          </a:fontRef>
-        </p:style>
-        <p:txBody>
-          <a:bodyPr rtlCol="0" anchor="ctr"/>
-          <a:lstStyle/>
-          <a:p>
-            <a:pPr algn="ctr"/>
-            <a:endParaRPr lang="es-MX"/>
-          </a:p>
-        </p:txBody>
-      </p:sp>
-      <p:sp>
-        <p:nvSpPr>
-          <p:cNvPr id="28" name="Elipse 27" descr="Satélite con relleno sólido">
-            <a:extLst>
-              <a:ext uri="{FF2B5EF4-FFF2-40B4-BE49-F238E27FC236}">
-                <a16:creationId xmlns:a16="http://schemas.microsoft.com/office/drawing/2014/main" id="{90F648E1-6A85-669C-2D72-97F255218D11}"/>
-              </a:ext>
-            </a:extLst>
-          </p:cNvPr>
-          <p:cNvSpPr/>
-          <p:nvPr/>
-        </p:nvSpPr>
-        <p:spPr>
-          <a:xfrm>
-            <a:off x="6648119" y="4655680"/>
-            <a:ext cx="421131" cy="421131"/>
-          </a:xfrm>
-          <a:prstGeom prst="ellipse">
-            <a:avLst/>
-          </a:prstGeom>
-          <a:blipFill dpi="0" rotWithShape="1">
-            <a:blip r:embed="rId10">
-              <a:extLst>
-                <a:ext uri="{96DAC541-7B7A-43D3-8B79-37D633B846F1}">
-                  <asvg:svgBlip xmlns:asvg="http://schemas.microsoft.com/office/drawing/2016/SVG/main" r:embed="rId11"/>
-                </a:ext>
-              </a:extLst>
-            </a:blip>
-            <a:srcRect/>
-            <a:stretch>
-              <a:fillRect/>
-            </a:stretch>
-          </a:blipFill>
-          <a:ln w="19050">
-            <a:solidFill>
-              <a:schemeClr val="tx1"/>
-            </a:solidFill>
-          </a:ln>
-        </p:spPr>
-        <p:style>
-          <a:lnRef idx="2">
-            <a:schemeClr val="accent1">
-              <a:shade val="50000"/>
-            </a:schemeClr>
-          </a:lnRef>
-          <a:fillRef idx="1">
-            <a:schemeClr val="accent1"/>
-          </a:fillRef>
-          <a:effectRef idx="0">
-            <a:schemeClr val="accent1"/>
-          </a:effectRef>
-          <a:fontRef idx="minor">
-            <a:schemeClr val="lt1"/>
-          </a:fontRef>
-        </p:style>
-        <p:txBody>
-          <a:bodyPr rtlCol="0" anchor="ctr"/>
-          <a:lstStyle/>
-          <a:p>
-            <a:pPr algn="ctr"/>
-            <a:endParaRPr lang="es-MX"/>
-          </a:p>
-        </p:txBody>
-      </p:sp>
-      <p:sp>
-        <p:nvSpPr>
-          <p:cNvPr id="31" name="Elipse 30" descr="Satélite con relleno sólido">
-            <a:extLst>
-              <a:ext uri="{FF2B5EF4-FFF2-40B4-BE49-F238E27FC236}">
-                <a16:creationId xmlns:a16="http://schemas.microsoft.com/office/drawing/2014/main" id="{CB0A9B60-6007-50EC-35B6-F8B0C8A69839}"/>
-              </a:ext>
-            </a:extLst>
-          </p:cNvPr>
-          <p:cNvSpPr/>
-          <p:nvPr/>
-        </p:nvSpPr>
-        <p:spPr>
-          <a:xfrm>
-            <a:off x="3570738" y="4655680"/>
-            <a:ext cx="421131" cy="421131"/>
-          </a:xfrm>
-          <a:prstGeom prst="ellipse">
-            <a:avLst/>
-          </a:prstGeom>
-          <a:blipFill dpi="0" rotWithShape="1">
-            <a:blip r:embed="rId12">
-              <a:extLst>
-                <a:ext uri="{96DAC541-7B7A-43D3-8B79-37D633B846F1}">
-                  <asvg:svgBlip xmlns:asvg="http://schemas.microsoft.com/office/drawing/2016/SVG/main" r:embed="rId13"/>
-                </a:ext>
-              </a:extLst>
-            </a:blip>
-            <a:srcRect/>
-            <a:stretch>
-              <a:fillRect/>
-            </a:stretch>
-          </a:blipFill>
-          <a:ln w="19050">
-            <a:solidFill>
-              <a:schemeClr val="tx1"/>
-            </a:solidFill>
-          </a:ln>
-        </p:spPr>
-        <p:style>
-          <a:lnRef idx="2">
-            <a:schemeClr val="accent1">
-              <a:shade val="50000"/>
-            </a:schemeClr>
-          </a:lnRef>
-          <a:fillRef idx="1">
-            <a:schemeClr val="accent1"/>
-          </a:fillRef>
-          <a:effectRef idx="0">
-            <a:schemeClr val="accent1"/>
-          </a:effectRef>
-          <a:fontRef idx="minor">
-            <a:schemeClr val="lt1"/>
-          </a:fontRef>
-        </p:style>
-        <p:txBody>
-          <a:bodyPr rtlCol="0" anchor="ctr"/>
-          <a:lstStyle/>
-          <a:p>
-            <a:pPr algn="ctr"/>
-            <a:endParaRPr lang="es-MX"/>
-          </a:p>
-        </p:txBody>
-      </p:sp>
-      <p:sp>
-        <p:nvSpPr>
-          <p:cNvPr id="32" name="Elipse 31" descr="Satélite con relleno sólido">
-            <a:extLst>
-              <a:ext uri="{FF2B5EF4-FFF2-40B4-BE49-F238E27FC236}">
-                <a16:creationId xmlns:a16="http://schemas.microsoft.com/office/drawing/2014/main" id="{2D9A0307-559B-EB28-66D2-2E6A7FE383DE}"/>
-              </a:ext>
-            </a:extLst>
-          </p:cNvPr>
-          <p:cNvSpPr/>
-          <p:nvPr/>
-        </p:nvSpPr>
-        <p:spPr>
-          <a:xfrm>
-            <a:off x="5109429" y="4655680"/>
-            <a:ext cx="421131" cy="421131"/>
-          </a:xfrm>
-          <a:prstGeom prst="ellipse">
-            <a:avLst/>
-          </a:prstGeom>
-          <a:blipFill dpi="0" rotWithShape="1">
-            <a:blip r:embed="rId14">
-              <a:extLst>
-                <a:ext uri="{96DAC541-7B7A-43D3-8B79-37D633B846F1}">
-                  <asvg:svgBlip xmlns:asvg="http://schemas.microsoft.com/office/drawing/2016/SVG/main" r:embed="rId15"/>
-                </a:ext>
-              </a:extLst>
-            </a:blip>
-            <a:srcRect/>
-            <a:stretch>
-              <a:fillRect/>
-            </a:stretch>
-          </a:blipFill>
-          <a:ln w="19050">
-            <a:solidFill>
-              <a:schemeClr val="tx1"/>
-            </a:solidFill>
-          </a:ln>
-        </p:spPr>
-        <p:style>
-          <a:lnRef idx="2">
-            <a:schemeClr val="accent1">
-              <a:shade val="50000"/>
-            </a:schemeClr>
-          </a:lnRef>
-          <a:fillRef idx="1">
-            <a:schemeClr val="accent1"/>
-          </a:fillRef>
-          <a:effectRef idx="0">
-            <a:schemeClr val="accent1"/>
-          </a:effectRef>
-          <a:fontRef idx="minor">
-            <a:schemeClr val="lt1"/>
-          </a:fontRef>
-        </p:style>
-        <p:txBody>
-          <a:bodyPr rtlCol="0" anchor="ctr"/>
-          <a:lstStyle/>
-          <a:p>
-            <a:pPr algn="ctr"/>
-            <a:endParaRPr lang="es-MX"/>
-          </a:p>
-        </p:txBody>
-      </p:sp>
-      <p:grpSp>
-        <p:nvGrpSpPr>
-          <p:cNvPr id="60" name="Grupo 59">
-            <a:extLst>
-              <a:ext uri="{FF2B5EF4-FFF2-40B4-BE49-F238E27FC236}">
-                <a16:creationId xmlns:a16="http://schemas.microsoft.com/office/drawing/2014/main" id="{C0B08284-1601-15A5-C86F-4670A5D603A8}"/>
-              </a:ext>
-            </a:extLst>
-          </p:cNvPr>
-          <p:cNvGrpSpPr/>
-          <p:nvPr/>
-        </p:nvGrpSpPr>
-        <p:grpSpPr>
-          <a:xfrm>
-            <a:off x="4082964" y="4656279"/>
-            <a:ext cx="421131" cy="421131"/>
-            <a:chOff x="5009770" y="3330967"/>
-            <a:chExt cx="421131" cy="421131"/>
-          </a:xfrm>
-        </p:grpSpPr>
-        <p:sp>
-          <p:nvSpPr>
-            <p:cNvPr id="61" name="Elipse 60" descr="Satélite con relleno sólido">
-              <a:extLst>
-                <a:ext uri="{FF2B5EF4-FFF2-40B4-BE49-F238E27FC236}">
-                  <a16:creationId xmlns:a16="http://schemas.microsoft.com/office/drawing/2014/main" id="{BA6DA723-262D-C9E4-8E49-BC8BE58B81C2}"/>
-                </a:ext>
-              </a:extLst>
-            </p:cNvPr>
-            <p:cNvSpPr/>
-            <p:nvPr/>
-          </p:nvSpPr>
-          <p:spPr>
-            <a:xfrm>
-              <a:off x="5009770" y="3330967"/>
-              <a:ext cx="421131" cy="421131"/>
-            </a:xfrm>
-            <a:prstGeom prst="ellipse">
-              <a:avLst/>
-            </a:prstGeom>
-            <a:blipFill dpi="0" rotWithShape="1">
-              <a:blip r:embed="rId16">
-                <a:extLst>
-                  <a:ext uri="{96DAC541-7B7A-43D3-8B79-37D633B846F1}">
-                    <asvg:svgBlip xmlns:asvg="http://schemas.microsoft.com/office/drawing/2016/SVG/main" r:embed="rId17"/>
-                  </a:ext>
-                </a:extLst>
-              </a:blip>
-              <a:srcRect/>
-              <a:stretch>
-                <a:fillRect/>
-              </a:stretch>
-            </a:blipFill>
-            <a:ln w="19050">
-              <a:solidFill>
-                <a:schemeClr val="tx1"/>
-              </a:solidFill>
-            </a:ln>
-          </p:spPr>
-          <p:style>
-            <a:lnRef idx="2">
-              <a:schemeClr val="accent1">
-                <a:shade val="50000"/>
-              </a:schemeClr>
-            </a:lnRef>
-            <a:fillRef idx="1">
-              <a:schemeClr val="accent1"/>
-            </a:fillRef>
-            <a:effectRef idx="0">
-              <a:schemeClr val="accent1"/>
-            </a:effectRef>
-            <a:fontRef idx="minor">
-              <a:schemeClr val="lt1"/>
-            </a:fontRef>
-          </p:style>
-          <p:txBody>
-            <a:bodyPr rtlCol="0" anchor="ctr"/>
-            <a:lstStyle/>
-            <a:p>
-              <a:pPr algn="ctr"/>
-              <a:endParaRPr lang="es-MX"/>
-            </a:p>
-          </p:txBody>
-        </p:sp>
-        <p:pic>
-          <p:nvPicPr>
-            <p:cNvPr id="62" name="Gráfico 61" descr="Planta con relleno sólido">
-              <a:extLst>
-                <a:ext uri="{FF2B5EF4-FFF2-40B4-BE49-F238E27FC236}">
-                  <a16:creationId xmlns:a16="http://schemas.microsoft.com/office/drawing/2014/main" id="{28541FD8-4AFA-930A-097B-E08C2491BA2A}"/>
-                </a:ext>
-              </a:extLst>
-            </p:cNvPr>
-            <p:cNvPicPr>
-              <a:picLocks noChangeAspect="1"/>
-            </p:cNvPicPr>
-            <p:nvPr/>
-          </p:nvPicPr>
-          <p:blipFill>
-            <a:blip r:embed="rId18">
-              <a:extLst>
-                <a:ext uri="{28A0092B-C50C-407E-A947-70E740481C1C}">
-                  <a14:useLocalDpi xmlns:a14="http://schemas.microsoft.com/office/drawing/2010/main" val="0"/>
-                </a:ext>
-                <a:ext uri="{96DAC541-7B7A-43D3-8B79-37D633B846F1}">
-                  <asvg:svgBlip xmlns:asvg="http://schemas.microsoft.com/office/drawing/2016/SVG/main" r:embed="rId19"/>
-                </a:ext>
-              </a:extLst>
-            </a:blip>
-            <a:stretch>
-              <a:fillRect/>
-            </a:stretch>
-          </p:blipFill>
-          <p:spPr>
-            <a:xfrm rot="1309914">
-              <a:off x="5075084" y="3396168"/>
-              <a:ext cx="238483" cy="238483"/>
-            </a:xfrm>
-            <a:prstGeom prst="rect">
-              <a:avLst/>
-            </a:prstGeom>
-          </p:spPr>
-        </p:pic>
-      </p:grpSp>
-      <p:pic>
-        <p:nvPicPr>
-          <p:cNvPr id="63" name="Imagen 62">
-            <a:extLst>
-              <a:ext uri="{FF2B5EF4-FFF2-40B4-BE49-F238E27FC236}">
-                <a16:creationId xmlns:a16="http://schemas.microsoft.com/office/drawing/2014/main" id="{00A0E995-6A8F-59C3-FF25-E6352AFCAED0}"/>
-              </a:ext>
-            </a:extLst>
-          </p:cNvPr>
-          <p:cNvPicPr>
-            <a:picLocks noChangeAspect="1"/>
-          </p:cNvPicPr>
-          <p:nvPr/>
-        </p:nvPicPr>
-        <p:blipFill>
-          <a:blip r:embed="rId20"/>
-          <a:stretch>
-            <a:fillRect/>
-          </a:stretch>
-        </p:blipFill>
-        <p:spPr>
-          <a:xfrm rot="157431">
-            <a:off x="7904058" y="3379899"/>
-            <a:ext cx="283326" cy="443794"/>
-          </a:xfrm>
-          <a:prstGeom prst="rect">
-            <a:avLst/>
-          </a:prstGeom>
-        </p:spPr>
-      </p:pic>
-      <p:grpSp>
-        <p:nvGrpSpPr>
-          <p:cNvPr id="64" name="Grupo 63">
-            <a:extLst>
-              <a:ext uri="{FF2B5EF4-FFF2-40B4-BE49-F238E27FC236}">
-                <a16:creationId xmlns:a16="http://schemas.microsoft.com/office/drawing/2014/main" id="{441BE447-B975-C6E9-2831-0124E775EDB9}"/>
-              </a:ext>
-            </a:extLst>
-          </p:cNvPr>
-          <p:cNvGrpSpPr/>
-          <p:nvPr/>
-        </p:nvGrpSpPr>
-        <p:grpSpPr>
-          <a:xfrm>
-            <a:off x="7935562" y="4587594"/>
-            <a:ext cx="663950" cy="550264"/>
-            <a:chOff x="7992055" y="4655844"/>
-            <a:chExt cx="663950" cy="550264"/>
-          </a:xfrm>
-        </p:grpSpPr>
-        <p:sp>
-          <p:nvSpPr>
-            <p:cNvPr id="65" name="Flecha: curvada hacia abajo 64">
-              <a:extLst>
-                <a:ext uri="{FF2B5EF4-FFF2-40B4-BE49-F238E27FC236}">
-                  <a16:creationId xmlns:a16="http://schemas.microsoft.com/office/drawing/2014/main" id="{464D39B0-D5C6-7159-C0CC-04984F33B805}"/>
-                </a:ext>
-              </a:extLst>
-            </p:cNvPr>
-            <p:cNvSpPr/>
-            <p:nvPr/>
-          </p:nvSpPr>
-          <p:spPr>
-            <a:xfrm rot="3187469">
-              <a:off x="8253074" y="4747701"/>
-              <a:ext cx="416560" cy="232845"/>
-            </a:xfrm>
-            <a:prstGeom prst="curvedDownArrow">
-              <a:avLst/>
-            </a:prstGeom>
-          </p:spPr>
-          <p:style>
-            <a:lnRef idx="2">
-              <a:schemeClr val="accent1">
-                <a:shade val="50000"/>
-              </a:schemeClr>
-            </a:lnRef>
-            <a:fillRef idx="1">
-              <a:schemeClr val="accent1"/>
-            </a:fillRef>
-            <a:effectRef idx="0">
-              <a:schemeClr val="accent1"/>
-            </a:effectRef>
-            <a:fontRef idx="minor">
-              <a:schemeClr val="lt1"/>
-            </a:fontRef>
-          </p:style>
-          <p:txBody>
-            <a:bodyPr rtlCol="0" anchor="ctr"/>
-            <a:lstStyle/>
-            <a:p>
-              <a:pPr algn="ctr"/>
-              <a:endParaRPr lang="es-MX">
-                <a:solidFill>
-                  <a:schemeClr val="tx1"/>
-                </a:solidFill>
-              </a:endParaRPr>
-            </a:p>
-          </p:txBody>
-        </p:sp>
-        <p:sp>
-          <p:nvSpPr>
-            <p:cNvPr id="66" name="Flecha: curvada hacia abajo 65">
-              <a:extLst>
-                <a:ext uri="{FF2B5EF4-FFF2-40B4-BE49-F238E27FC236}">
-                  <a16:creationId xmlns:a16="http://schemas.microsoft.com/office/drawing/2014/main" id="{D2E0B506-BFF8-1F3C-3D40-0CE1B562DBFA}"/>
-                </a:ext>
-              </a:extLst>
-            </p:cNvPr>
-            <p:cNvSpPr/>
-            <p:nvPr/>
-          </p:nvSpPr>
-          <p:spPr>
-            <a:xfrm rot="14656350">
-              <a:off x="7965809" y="4881405"/>
-              <a:ext cx="416560" cy="232845"/>
-            </a:xfrm>
-            <a:prstGeom prst="curvedDownArrow">
-              <a:avLst/>
-            </a:prstGeom>
-          </p:spPr>
-          <p:style>
-            <a:lnRef idx="2">
-              <a:schemeClr val="accent1">
-                <a:shade val="50000"/>
-              </a:schemeClr>
-            </a:lnRef>
-            <a:fillRef idx="1">
-              <a:schemeClr val="accent1"/>
-            </a:fillRef>
-            <a:effectRef idx="0">
-              <a:schemeClr val="accent1"/>
-            </a:effectRef>
-            <a:fontRef idx="minor">
-              <a:schemeClr val="lt1"/>
-            </a:fontRef>
-          </p:style>
-          <p:txBody>
-            <a:bodyPr rtlCol="0" anchor="ctr"/>
-            <a:lstStyle/>
-            <a:p>
-              <a:pPr algn="ctr"/>
-              <a:endParaRPr lang="es-MX">
-                <a:solidFill>
-                  <a:schemeClr val="tx1"/>
-                </a:solidFill>
-              </a:endParaRPr>
-            </a:p>
-          </p:txBody>
-        </p:sp>
-        <p:sp>
-          <p:nvSpPr>
-            <p:cNvPr id="67" name="Rectángulo 66">
-              <a:extLst>
-                <a:ext uri="{FF2B5EF4-FFF2-40B4-BE49-F238E27FC236}">
-                  <a16:creationId xmlns:a16="http://schemas.microsoft.com/office/drawing/2014/main" id="{EF0979B1-B861-4E84-8DE2-053CA8E8209E}"/>
-                </a:ext>
-              </a:extLst>
-            </p:cNvPr>
-            <p:cNvSpPr/>
-            <p:nvPr/>
-          </p:nvSpPr>
-          <p:spPr>
-            <a:xfrm rot="19990860">
-              <a:off x="8380258" y="5051594"/>
-              <a:ext cx="63302" cy="63302"/>
-            </a:xfrm>
-            <a:prstGeom prst="rect">
-              <a:avLst/>
-            </a:prstGeom>
-          </p:spPr>
-          <p:style>
-            <a:lnRef idx="2">
-              <a:schemeClr val="accent1">
-                <a:shade val="50000"/>
-              </a:schemeClr>
-            </a:lnRef>
-            <a:fillRef idx="1">
-              <a:schemeClr val="accent1"/>
-            </a:fillRef>
-            <a:effectRef idx="0">
-              <a:schemeClr val="accent1"/>
-            </a:effectRef>
-            <a:fontRef idx="minor">
-              <a:schemeClr val="lt1"/>
-            </a:fontRef>
-          </p:style>
-          <p:txBody>
-            <a:bodyPr rtlCol="0" anchor="ctr"/>
-            <a:lstStyle/>
-            <a:p>
-              <a:pPr algn="ctr"/>
-              <a:endParaRPr lang="es-MX"/>
-            </a:p>
-          </p:txBody>
-        </p:sp>
-        <p:grpSp>
-          <p:nvGrpSpPr>
-            <p:cNvPr id="68" name="Grupo 67">
-              <a:extLst>
-                <a:ext uri="{FF2B5EF4-FFF2-40B4-BE49-F238E27FC236}">
-                  <a16:creationId xmlns:a16="http://schemas.microsoft.com/office/drawing/2014/main" id="{8A480A62-D725-CA39-6CA1-767B4C5B9066}"/>
-                </a:ext>
-              </a:extLst>
-            </p:cNvPr>
-            <p:cNvGrpSpPr/>
-            <p:nvPr/>
-          </p:nvGrpSpPr>
-          <p:grpSpPr>
-            <a:xfrm rot="19602821">
-              <a:off x="7992055" y="4756102"/>
-              <a:ext cx="663950" cy="344959"/>
-              <a:chOff x="10446969" y="5174945"/>
-              <a:chExt cx="663950" cy="344959"/>
-            </a:xfrm>
-          </p:grpSpPr>
-          <p:sp>
-            <p:nvSpPr>
-              <p:cNvPr id="69" name="CuadroTexto 68">
-                <a:extLst>
-                  <a:ext uri="{FF2B5EF4-FFF2-40B4-BE49-F238E27FC236}">
-                    <a16:creationId xmlns:a16="http://schemas.microsoft.com/office/drawing/2014/main" id="{149FF7C9-7335-71AA-0F44-E3F324D20C74}"/>
-                  </a:ext>
-                </a:extLst>
-              </p:cNvPr>
-              <p:cNvSpPr txBox="1"/>
-              <p:nvPr/>
-            </p:nvSpPr>
-            <p:spPr>
-              <a:xfrm rot="21482985">
-                <a:off x="10480118" y="5174945"/>
-                <a:ext cx="469891" cy="253916"/>
-              </a:xfrm>
-              <a:prstGeom prst="rect">
-                <a:avLst/>
-              </a:prstGeom>
-              <a:noFill/>
-            </p:spPr>
-            <p:txBody>
-              <a:bodyPr wrap="square" rtlCol="0">
-                <a:spAutoFit/>
-              </a:bodyPr>
-              <a:lstStyle/>
-              <a:p>
-                <a:pPr algn="ctr"/>
-                <a:r>
-                  <a:rPr lang="es-MX" sz="1050" b="1" spc="100" dirty="0">
-                    <a:solidFill>
-                      <a:schemeClr val="tx1"/>
-                    </a:solidFill>
-                    <a:effectLst>
-                      <a:outerShdw blurRad="38100" dist="38100" dir="2700000" algn="tl">
-                        <a:srgbClr val="000000">
-                          <a:alpha val="43137"/>
-                        </a:srgbClr>
-                      </a:outerShdw>
-                    </a:effectLst>
-                    <a:latin typeface="Agency FB" panose="020B0503020202020204" pitchFamily="34" charset="0"/>
-                  </a:rPr>
-                  <a:t>Gaia</a:t>
-                </a:r>
-                <a:endParaRPr lang="es-MX" sz="900" b="1" spc="100" dirty="0">
-                  <a:solidFill>
-                    <a:schemeClr val="tx1"/>
-                  </a:solidFill>
-                  <a:effectLst>
-                    <a:outerShdw blurRad="38100" dist="38100" dir="2700000" algn="tl">
-                      <a:srgbClr val="000000">
-                        <a:alpha val="43137"/>
-                      </a:srgbClr>
-                    </a:outerShdw>
-                  </a:effectLst>
-                  <a:latin typeface="Agency FB" panose="020B0503020202020204" pitchFamily="34" charset="0"/>
-                </a:endParaRPr>
-              </a:p>
-            </p:txBody>
-          </p:sp>
-          <p:sp>
-            <p:nvSpPr>
-              <p:cNvPr id="70" name="CuadroTexto 69">
-                <a:extLst>
-                  <a:ext uri="{FF2B5EF4-FFF2-40B4-BE49-F238E27FC236}">
-                    <a16:creationId xmlns:a16="http://schemas.microsoft.com/office/drawing/2014/main" id="{5D724B93-5889-590C-0671-CDF12A41CA62}"/>
-                  </a:ext>
-                </a:extLst>
-              </p:cNvPr>
-              <p:cNvSpPr txBox="1"/>
-              <p:nvPr/>
-            </p:nvSpPr>
-            <p:spPr>
-              <a:xfrm rot="21518147">
-                <a:off x="10446969" y="5273683"/>
-                <a:ext cx="663950" cy="246221"/>
-              </a:xfrm>
-              <a:prstGeom prst="rect">
-                <a:avLst/>
-              </a:prstGeom>
-              <a:noFill/>
-            </p:spPr>
-            <p:txBody>
-              <a:bodyPr wrap="square" rtlCol="0">
-                <a:spAutoFit/>
-              </a:bodyPr>
-              <a:lstStyle/>
-              <a:p>
-                <a:pPr algn="ctr"/>
-                <a:r>
-                  <a:rPr lang="es-MX" sz="1000" spc="50" dirty="0" err="1">
-                    <a:solidFill>
-                      <a:schemeClr val="tx1"/>
-                    </a:solidFill>
-                    <a:effectLst>
-                      <a:outerShdw blurRad="38100" dist="38100" dir="2700000" algn="tl">
-                        <a:srgbClr val="000000">
-                          <a:alpha val="43137"/>
-                        </a:srgbClr>
-                      </a:outerShdw>
-                    </a:effectLst>
-                    <a:latin typeface="Agency FB" panose="020B0503020202020204" pitchFamily="34" charset="0"/>
-                  </a:rPr>
-                  <a:t>inside</a:t>
-                </a:r>
-                <a:endParaRPr lang="es-MX" sz="700" spc="50" dirty="0">
-                  <a:solidFill>
-                    <a:schemeClr val="tx1"/>
-                  </a:solidFill>
-                  <a:effectLst>
-                    <a:outerShdw blurRad="38100" dist="38100" dir="2700000" algn="tl">
-                      <a:srgbClr val="000000">
-                        <a:alpha val="43137"/>
-                      </a:srgbClr>
-                    </a:outerShdw>
-                  </a:effectLst>
-                  <a:latin typeface="Agency FB" panose="020B0503020202020204" pitchFamily="34" charset="0"/>
-                </a:endParaRPr>
-              </a:p>
-            </p:txBody>
-          </p:sp>
-        </p:grpSp>
-      </p:grpSp>
-    </p:spTree>
-    <p:extLst>
-      <p:ext uri="{BB962C8B-B14F-4D97-AF65-F5344CB8AC3E}">
-        <p14:creationId xmlns:p14="http://schemas.microsoft.com/office/powerpoint/2010/main" val="3727799641"/>
-      </p:ext>
-    </p:extLst>
-  </p:cSld>
-  <p:clrMapOvr>
-    <a:masterClrMapping/>
-  </p:clrMapOvr>
-</p:sld>
-</file>
-
 <file path=ppt/theme/theme1.xml><?xml version="1.0" encoding="utf-8"?>
 <a:theme xmlns:a="http://schemas.openxmlformats.org/drawingml/2006/main" name="Tema de Office">
   <a:themeElements>

</xml_diff>